<commit_message>
Ajuste de formulas en mapa conceptual mat 8 tema 3
</commit_message>
<xml_diff>
--- a/fuentes/contenidos/grado08/guion03/Mapa conceptual.pptx
+++ b/fuentes/contenidos/grado08/guion03/Mapa conceptual.pptx
@@ -450,7 +450,7 @@
           <a:p>
             <a:fld id="{5001C876-01F7-4317-94B9-1AE222133113}" type="datetimeFigureOut">
               <a:rPr lang="es-ES" smtClean="0"/>
-              <a:t>27/08/2015</a:t>
+              <a:t>01/09/2015</a:t>
             </a:fld>
             <a:endParaRPr lang="es-ES"/>
           </a:p>
@@ -1065,14 +1065,7 @@
                 <a:latin typeface="Arial" panose="020B0604020202020204" pitchFamily="34" charset="0"/>
                 <a:cs typeface="Arial" panose="020B0604020202020204" pitchFamily="34" charset="0"/>
               </a:rPr>
-              <a:t>Identidades </a:t>
-            </a:r>
-            <a:r>
-              <a:rPr lang="es-ES" sz="1600" dirty="0" smtClean="0">
-                <a:latin typeface="Arial" panose="020B0604020202020204" pitchFamily="34" charset="0"/>
-                <a:cs typeface="Arial" panose="020B0604020202020204" pitchFamily="34" charset="0"/>
-              </a:rPr>
-              <a:t>notables</a:t>
+              <a:t>Identidades notables</a:t>
             </a:r>
             <a:endParaRPr lang="es-ES" sz="1600" dirty="0">
               <a:latin typeface="Arial" panose="020B0604020202020204" pitchFamily="34" charset="0"/>
@@ -1192,236 +1185,60 @@
           </a:fontRef>
         </p:style>
       </p:cxnSp>
-      <mc:AlternateContent xmlns:mc="http://schemas.openxmlformats.org/markup-compatibility/2006">
-        <mc:Choice xmlns:a14="http://schemas.microsoft.com/office/drawing/2010/main" Requires="a14">
-          <p:sp>
-            <p:nvSpPr>
-              <p:cNvPr id="343" name="Rectángulo 342" descr="Nodo de tercer nivel" title="Nodo03"/>
-              <p:cNvSpPr/>
-              <p:nvPr/>
-            </p:nvSpPr>
-            <p:spPr>
-              <a:xfrm>
-                <a:off x="6783431" y="3382936"/>
-                <a:ext cx="441094" cy="343441"/>
-              </a:xfrm>
-              <a:prstGeom prst="rect">
-                <a:avLst/>
-              </a:prstGeom>
+      <p:sp>
+        <p:nvSpPr>
+          <p:cNvPr id="343" name="Rectángulo 342" descr="Nodo de tercer nivel" title="Nodo03"/>
+          <p:cNvSpPr/>
+          <p:nvPr/>
+        </p:nvSpPr>
+        <p:spPr>
+          <a:xfrm>
+            <a:off x="6783431" y="3366768"/>
+            <a:ext cx="441094" cy="343441"/>
+          </a:xfrm>
+          <a:prstGeom prst="rect">
+            <a:avLst/>
+          </a:prstGeom>
+          <a:solidFill>
+            <a:schemeClr val="bg2">
+              <a:lumMod val="90000"/>
+            </a:schemeClr>
+          </a:solidFill>
+          <a:ln>
+            <a:solidFill>
+              <a:schemeClr val="tx1"/>
+            </a:solidFill>
+          </a:ln>
+        </p:spPr>
+        <p:style>
+          <a:lnRef idx="2">
+            <a:schemeClr val="accent6"/>
+          </a:lnRef>
+          <a:fillRef idx="1">
+            <a:schemeClr val="lt1"/>
+          </a:fillRef>
+          <a:effectRef idx="0">
+            <a:schemeClr val="accent6"/>
+          </a:effectRef>
+          <a:fontRef idx="minor">
+            <a:schemeClr val="dk1"/>
+          </a:fontRef>
+        </p:style>
+        <p:txBody>
+          <a:bodyPr rtlCol="0" anchor="ctr"/>
+          <a:lstStyle/>
+          <a:p>
+            <a:pPr algn="ctr"/>
+            <a:endParaRPr lang="es-ES" sz="900" dirty="0">
               <a:solidFill>
-                <a:schemeClr val="bg2">
-                  <a:lumMod val="90000"/>
-                </a:schemeClr>
+                <a:schemeClr val="tx1"/>
               </a:solidFill>
-              <a:ln>
-                <a:solidFill>
-                  <a:schemeClr val="tx1"/>
-                </a:solidFill>
-              </a:ln>
-            </p:spPr>
-            <p:style>
-              <a:lnRef idx="2">
-                <a:schemeClr val="accent6"/>
-              </a:lnRef>
-              <a:fillRef idx="1">
-                <a:schemeClr val="lt1"/>
-              </a:fillRef>
-              <a:effectRef idx="0">
-                <a:schemeClr val="accent6"/>
-              </a:effectRef>
-              <a:fontRef idx="minor">
-                <a:schemeClr val="dk1"/>
-              </a:fontRef>
-            </p:style>
-            <p:txBody>
-              <a:bodyPr rtlCol="0" anchor="ctr"/>
-              <a:lstStyle/>
-              <a:p>
-                <a:pPr algn="ctr"/>
-                <a14:m>
-                  <m:oMathPara xmlns:m="http://schemas.openxmlformats.org/officeDocument/2006/math">
-                    <m:oMathParaPr>
-                      <m:jc m:val="centerGroup"/>
-                    </m:oMathParaPr>
-                    <m:oMath xmlns:m="http://schemas.openxmlformats.org/officeDocument/2006/math">
-                      <m:f>
-                        <m:fPr>
-                          <m:ctrlPr>
-                            <a:rPr lang="es-ES" sz="900" i="1" smtClean="0">
-                              <a:solidFill>
-                                <a:schemeClr val="tx1"/>
-                              </a:solidFill>
-                              <a:latin typeface="Cambria Math" panose="02040503050406030204" pitchFamily="18" charset="0"/>
-                            </a:rPr>
-                          </m:ctrlPr>
-                        </m:fPr>
-                        <m:num>
-                          <m:sSup>
-                            <m:sSupPr>
-                              <m:ctrlPr>
-                                <a:rPr lang="es-ES" sz="900" i="1" smtClean="0">
-                                  <a:solidFill>
-                                    <a:schemeClr val="tx1"/>
-                                  </a:solidFill>
-                                  <a:latin typeface="Cambria Math" panose="02040503050406030204" pitchFamily="18" charset="0"/>
-                                </a:rPr>
-                              </m:ctrlPr>
-                            </m:sSupPr>
-                            <m:e>
-                              <m:r>
-                                <a:rPr lang="es-CO" sz="900" b="0" i="1" smtClean="0">
-                                  <a:solidFill>
-                                    <a:schemeClr val="tx1"/>
-                                  </a:solidFill>
-                                  <a:latin typeface="Cambria Math" panose="02040503050406030204" pitchFamily="18" charset="0"/>
-                                </a:rPr>
-                                <m:t>𝑎</m:t>
-                              </m:r>
-                            </m:e>
-                            <m:sup>
-                              <m:r>
-                                <a:rPr lang="es-CO" sz="900" b="0" i="1" smtClean="0">
-                                  <a:solidFill>
-                                    <a:schemeClr val="tx1"/>
-                                  </a:solidFill>
-                                  <a:latin typeface="Cambria Math" panose="02040503050406030204" pitchFamily="18" charset="0"/>
-                                </a:rPr>
-                                <m:t>𝑛</m:t>
-                              </m:r>
-                            </m:sup>
-                          </m:sSup>
-                          <m:r>
-                            <a:rPr lang="es-CO" sz="900" b="0" i="1" smtClean="0">
-                              <a:solidFill>
-                                <a:schemeClr val="tx1"/>
-                              </a:solidFill>
-                              <a:latin typeface="Cambria Math" panose="02040503050406030204" pitchFamily="18" charset="0"/>
-                            </a:rPr>
-                            <m:t>−</m:t>
-                          </m:r>
-                          <m:sSup>
-                            <m:sSupPr>
-                              <m:ctrlPr>
-                                <a:rPr lang="es-CO" sz="900" b="0" i="1" smtClean="0">
-                                  <a:solidFill>
-                                    <a:schemeClr val="tx1"/>
-                                  </a:solidFill>
-                                  <a:latin typeface="Cambria Math" panose="02040503050406030204" pitchFamily="18" charset="0"/>
-                                </a:rPr>
-                              </m:ctrlPr>
-                            </m:sSupPr>
-                            <m:e>
-                              <m:r>
-                                <a:rPr lang="es-CO" sz="900" b="0" i="1" smtClean="0">
-                                  <a:solidFill>
-                                    <a:schemeClr val="tx1"/>
-                                  </a:solidFill>
-                                  <a:latin typeface="Cambria Math" panose="02040503050406030204" pitchFamily="18" charset="0"/>
-                                </a:rPr>
-                                <m:t>𝑏</m:t>
-                              </m:r>
-                            </m:e>
-                            <m:sup>
-                              <m:r>
-                                <a:rPr lang="es-CO" sz="900" b="0" i="1" smtClean="0">
-                                  <a:solidFill>
-                                    <a:schemeClr val="tx1"/>
-                                  </a:solidFill>
-                                  <a:latin typeface="Cambria Math" panose="02040503050406030204" pitchFamily="18" charset="0"/>
-                                </a:rPr>
-                                <m:t>𝑛</m:t>
-                              </m:r>
-                            </m:sup>
-                          </m:sSup>
-                        </m:num>
-                        <m:den>
-                          <m:r>
-                            <a:rPr lang="es-CO" sz="900" b="0" i="1" smtClean="0">
-                              <a:solidFill>
-                                <a:schemeClr val="tx1"/>
-                              </a:solidFill>
-                              <a:latin typeface="Cambria Math" panose="02040503050406030204" pitchFamily="18" charset="0"/>
-                            </a:rPr>
-                            <m:t>𝑎</m:t>
-                          </m:r>
-                          <m:r>
-                            <a:rPr lang="es-CO" sz="900" b="0" i="1" smtClean="0">
-                              <a:solidFill>
-                                <a:schemeClr val="tx1"/>
-                              </a:solidFill>
-                              <a:latin typeface="Cambria Math" panose="02040503050406030204" pitchFamily="18" charset="0"/>
-                            </a:rPr>
-                            <m:t>−</m:t>
-                          </m:r>
-                          <m:r>
-                            <a:rPr lang="es-CO" sz="900" b="0" i="1" smtClean="0">
-                              <a:solidFill>
-                                <a:schemeClr val="tx1"/>
-                              </a:solidFill>
-                              <a:latin typeface="Cambria Math" panose="02040503050406030204" pitchFamily="18" charset="0"/>
-                            </a:rPr>
-                            <m:t>𝑏</m:t>
-                          </m:r>
-                        </m:den>
-                      </m:f>
-                    </m:oMath>
-                  </m:oMathPara>
-                </a14:m>
-                <a:endParaRPr lang="es-ES" sz="900" dirty="0">
-                  <a:solidFill>
-                    <a:schemeClr val="tx1"/>
-                  </a:solidFill>
-                  <a:latin typeface="Arial" panose="020B0604020202020204" pitchFamily="34" charset="0"/>
-                  <a:cs typeface="Arial" panose="020B0604020202020204" pitchFamily="34" charset="0"/>
-                </a:endParaRPr>
-              </a:p>
-            </p:txBody>
-          </p:sp>
-        </mc:Choice>
-        <mc:Fallback>
-          <p:sp>
-            <p:nvSpPr>
-              <p:cNvPr id="343" name="Rectángulo 342" descr="Nodo de tercer nivel" title="Nodo03"/>
-              <p:cNvSpPr>
-                <a:spLocks noRot="1" noChangeAspect="1" noMove="1" noResize="1" noEditPoints="1" noAdjustHandles="1" noChangeArrowheads="1" noChangeShapeType="1" noTextEdit="1"/>
-              </p:cNvSpPr>
-              <p:nvPr/>
-            </p:nvSpPr>
-            <p:spPr>
-              <a:xfrm>
-                <a:off x="6783431" y="3382936"/>
-                <a:ext cx="441094" cy="343441"/>
-              </a:xfrm>
-              <a:prstGeom prst="rect">
-                <a:avLst/>
-              </a:prstGeom>
-              <a:blipFill rotWithShape="0">
-                <a:blip r:embed="rId2"/>
-                <a:stretch>
-                  <a:fillRect l="-4054"/>
-                </a:stretch>
-              </a:blipFill>
-              <a:ln>
-                <a:solidFill>
-                  <a:schemeClr val="tx1"/>
-                </a:solidFill>
-              </a:ln>
-            </p:spPr>
-            <p:txBody>
-              <a:bodyPr/>
-              <a:lstStyle/>
-              <a:p>
-                <a:r>
-                  <a:rPr lang="es-CO">
-                    <a:noFill/>
-                  </a:rPr>
-                  <a:t> </a:t>
-                </a:r>
-              </a:p>
-            </p:txBody>
-          </p:sp>
-        </mc:Fallback>
-      </mc:AlternateContent>
+              <a:latin typeface="Arial" panose="020B0604020202020204" pitchFamily="34" charset="0"/>
+              <a:cs typeface="Arial" panose="020B0604020202020204" pitchFamily="34" charset="0"/>
+            </a:endParaRPr>
+          </a:p>
+        </p:txBody>
+      </p:sp>
       <p:sp>
         <p:nvSpPr>
           <p:cNvPr id="344" name="Rectángulo 343" descr="Nodo de cuarto nivel&#10;" title="Nodo04"/>
@@ -1471,37 +1288,7 @@
                 <a:latin typeface="Arial" panose="020B0604020202020204" pitchFamily="34" charset="0"/>
                 <a:cs typeface="Arial" panose="020B0604020202020204" pitchFamily="34" charset="0"/>
               </a:rPr>
-              <a:t>se </a:t>
-            </a:r>
-            <a:r>
-              <a:rPr lang="es-ES" sz="800" dirty="0" smtClean="0">
-                <a:solidFill>
-                  <a:schemeClr val="tx1"/>
-                </a:solidFill>
-                <a:latin typeface="Arial" panose="020B0604020202020204" pitchFamily="34" charset="0"/>
-                <a:cs typeface="Arial" panose="020B0604020202020204" pitchFamily="34" charset="0"/>
-              </a:rPr>
-              <a:t>cumple para </a:t>
-            </a:r>
-            <a:r>
-              <a:rPr lang="es-ES" sz="800" dirty="0" smtClean="0">
-                <a:solidFill>
-                  <a:schemeClr val="tx1"/>
-                </a:solidFill>
-                <a:latin typeface="Arial" panose="020B0604020202020204" pitchFamily="34" charset="0"/>
-                <a:cs typeface="Arial" panose="020B0604020202020204" pitchFamily="34" charset="0"/>
-              </a:rPr>
-              <a:t>cualquier entero </a:t>
-            </a:r>
-            <a:r>
-              <a:rPr lang="es-ES" sz="800" dirty="0" smtClean="0">
-                <a:solidFill>
-                  <a:schemeClr val="tx1"/>
-                </a:solidFill>
-                <a:latin typeface="Arial" panose="020B0604020202020204" pitchFamily="34" charset="0"/>
-                <a:cs typeface="Arial" panose="020B0604020202020204" pitchFamily="34" charset="0"/>
-              </a:rPr>
-              <a:t>positivo </a:t>
+              <a:t>se cumple para cualquier entero positivo </a:t>
             </a:r>
             <a:r>
               <a:rPr lang="es-ES" sz="800" i="1" dirty="0" smtClean="0">
@@ -1544,8 +1331,8 @@
         </p:nvCxnSpPr>
         <p:spPr>
           <a:xfrm rot="5400000">
-            <a:off x="7108684" y="2586793"/>
-            <a:ext cx="691438" cy="900849"/>
+            <a:off x="7116768" y="2578709"/>
+            <a:ext cx="675270" cy="900849"/>
           </a:xfrm>
           <a:prstGeom prst="bentConnector3">
             <a:avLst>
@@ -1647,464 +1434,112 @@
           </a:p>
         </p:txBody>
       </p:sp>
-      <mc:AlternateContent xmlns:mc="http://schemas.openxmlformats.org/markup-compatibility/2006">
-        <mc:Choice xmlns:a14="http://schemas.microsoft.com/office/drawing/2010/main" Requires="a14">
-          <p:sp>
-            <p:nvSpPr>
-              <p:cNvPr id="369" name="Rectángulo 368" descr="Nodo de tercer nivel" title="Nodo03"/>
-              <p:cNvSpPr/>
-              <p:nvPr/>
-            </p:nvSpPr>
-            <p:spPr>
-              <a:xfrm>
-                <a:off x="7582509" y="3386059"/>
-                <a:ext cx="494822" cy="343441"/>
-              </a:xfrm>
-              <a:prstGeom prst="rect">
-                <a:avLst/>
-              </a:prstGeom>
+      <p:sp>
+        <p:nvSpPr>
+          <p:cNvPr id="369" name="Rectángulo 368" descr="Nodo de tercer nivel" title="Nodo03"/>
+          <p:cNvSpPr/>
+          <p:nvPr/>
+        </p:nvSpPr>
+        <p:spPr>
+          <a:xfrm>
+            <a:off x="7582509" y="3386059"/>
+            <a:ext cx="494822" cy="343441"/>
+          </a:xfrm>
+          <a:prstGeom prst="rect">
+            <a:avLst/>
+          </a:prstGeom>
+          <a:solidFill>
+            <a:schemeClr val="bg2">
+              <a:lumMod val="90000"/>
+            </a:schemeClr>
+          </a:solidFill>
+          <a:ln>
+            <a:solidFill>
+              <a:schemeClr val="tx1"/>
+            </a:solidFill>
+          </a:ln>
+        </p:spPr>
+        <p:style>
+          <a:lnRef idx="2">
+            <a:schemeClr val="accent6"/>
+          </a:lnRef>
+          <a:fillRef idx="1">
+            <a:schemeClr val="lt1"/>
+          </a:fillRef>
+          <a:effectRef idx="0">
+            <a:schemeClr val="accent6"/>
+          </a:effectRef>
+          <a:fontRef idx="minor">
+            <a:schemeClr val="dk1"/>
+          </a:fontRef>
+        </p:style>
+        <p:txBody>
+          <a:bodyPr rtlCol="0" anchor="ctr"/>
+          <a:lstStyle/>
+          <a:p>
+            <a:pPr algn="ctr"/>
+            <a:endParaRPr lang="es-ES" sz="900" dirty="0">
               <a:solidFill>
-                <a:schemeClr val="bg2">
-                  <a:lumMod val="90000"/>
-                </a:schemeClr>
+                <a:schemeClr val="tx1"/>
               </a:solidFill>
-              <a:ln>
-                <a:solidFill>
-                  <a:schemeClr val="tx1"/>
-                </a:solidFill>
-              </a:ln>
-            </p:spPr>
-            <p:style>
-              <a:lnRef idx="2">
-                <a:schemeClr val="accent6"/>
-              </a:lnRef>
-              <a:fillRef idx="1">
-                <a:schemeClr val="lt1"/>
-              </a:fillRef>
-              <a:effectRef idx="0">
-                <a:schemeClr val="accent6"/>
-              </a:effectRef>
-              <a:fontRef idx="minor">
-                <a:schemeClr val="dk1"/>
-              </a:fontRef>
-            </p:style>
-            <p:txBody>
-              <a:bodyPr rtlCol="0" anchor="ctr"/>
-              <a:lstStyle/>
-              <a:p>
-                <a:pPr algn="ctr"/>
-                <a14:m>
-                  <m:oMathPara xmlns:m="http://schemas.openxmlformats.org/officeDocument/2006/math">
-                    <m:oMathParaPr>
-                      <m:jc m:val="centerGroup"/>
-                    </m:oMathParaPr>
-                    <m:oMath xmlns:m="http://schemas.openxmlformats.org/officeDocument/2006/math">
-                      <m:f>
-                        <m:fPr>
-                          <m:ctrlPr>
-                            <a:rPr lang="es-ES" sz="900" i="1" smtClean="0">
-                              <a:solidFill>
-                                <a:schemeClr val="tx1"/>
-                              </a:solidFill>
-                              <a:latin typeface="Cambria Math" panose="02040503050406030204" pitchFamily="18" charset="0"/>
-                            </a:rPr>
-                          </m:ctrlPr>
-                        </m:fPr>
-                        <m:num>
-                          <m:sSup>
-                            <m:sSupPr>
-                              <m:ctrlPr>
-                                <a:rPr lang="es-ES" sz="900" i="1" smtClean="0">
-                                  <a:solidFill>
-                                    <a:schemeClr val="tx1"/>
-                                  </a:solidFill>
-                                  <a:latin typeface="Cambria Math" panose="02040503050406030204" pitchFamily="18" charset="0"/>
-                                </a:rPr>
-                              </m:ctrlPr>
-                            </m:sSupPr>
-                            <m:e>
-                              <m:r>
-                                <a:rPr lang="es-CO" sz="900" b="0" i="1" smtClean="0">
-                                  <a:solidFill>
-                                    <a:schemeClr val="tx1"/>
-                                  </a:solidFill>
-                                  <a:latin typeface="Cambria Math" panose="02040503050406030204" pitchFamily="18" charset="0"/>
-                                </a:rPr>
-                                <m:t>𝑎</m:t>
-                              </m:r>
-                            </m:e>
-                            <m:sup>
-                              <m:r>
-                                <a:rPr lang="es-CO" sz="900" b="0" i="1" smtClean="0">
-                                  <a:solidFill>
-                                    <a:schemeClr val="tx1"/>
-                                  </a:solidFill>
-                                  <a:latin typeface="Cambria Math" panose="02040503050406030204" pitchFamily="18" charset="0"/>
-                                </a:rPr>
-                                <m:t>𝑛</m:t>
-                              </m:r>
-                            </m:sup>
-                          </m:sSup>
-                          <m:r>
-                            <a:rPr lang="es-CO" sz="900" b="0" i="1" smtClean="0">
-                              <a:solidFill>
-                                <a:schemeClr val="tx1"/>
-                              </a:solidFill>
-                              <a:latin typeface="Cambria Math" panose="02040503050406030204" pitchFamily="18" charset="0"/>
-                            </a:rPr>
-                            <m:t>−</m:t>
-                          </m:r>
-                          <m:sSup>
-                            <m:sSupPr>
-                              <m:ctrlPr>
-                                <a:rPr lang="es-CO" sz="900" b="0" i="1" smtClean="0">
-                                  <a:solidFill>
-                                    <a:schemeClr val="tx1"/>
-                                  </a:solidFill>
-                                  <a:latin typeface="Cambria Math" panose="02040503050406030204" pitchFamily="18" charset="0"/>
-                                </a:rPr>
-                              </m:ctrlPr>
-                            </m:sSupPr>
-                            <m:e>
-                              <m:r>
-                                <a:rPr lang="es-CO" sz="900" b="0" i="1" smtClean="0">
-                                  <a:solidFill>
-                                    <a:schemeClr val="tx1"/>
-                                  </a:solidFill>
-                                  <a:latin typeface="Cambria Math" panose="02040503050406030204" pitchFamily="18" charset="0"/>
-                                </a:rPr>
-                                <m:t>𝑏</m:t>
-                              </m:r>
-                            </m:e>
-                            <m:sup>
-                              <m:r>
-                                <a:rPr lang="es-CO" sz="900" b="0" i="1" smtClean="0">
-                                  <a:solidFill>
-                                    <a:schemeClr val="tx1"/>
-                                  </a:solidFill>
-                                  <a:latin typeface="Cambria Math" panose="02040503050406030204" pitchFamily="18" charset="0"/>
-                                </a:rPr>
-                                <m:t>𝑛</m:t>
-                              </m:r>
-                            </m:sup>
-                          </m:sSup>
-                        </m:num>
-                        <m:den>
-                          <m:r>
-                            <a:rPr lang="es-CO" sz="900" b="0" i="1" smtClean="0">
-                              <a:solidFill>
-                                <a:schemeClr val="tx1"/>
-                              </a:solidFill>
-                              <a:latin typeface="Cambria Math" panose="02040503050406030204" pitchFamily="18" charset="0"/>
-                            </a:rPr>
-                            <m:t>𝑎</m:t>
-                          </m:r>
-                          <m:r>
-                            <a:rPr lang="es-CO" sz="900" b="0" i="1" smtClean="0">
-                              <a:solidFill>
-                                <a:schemeClr val="tx1"/>
-                              </a:solidFill>
-                              <a:latin typeface="Cambria Math" panose="02040503050406030204" pitchFamily="18" charset="0"/>
-                            </a:rPr>
-                            <m:t>+</m:t>
-                          </m:r>
-                          <m:r>
-                            <a:rPr lang="es-CO" sz="900" b="0" i="1" smtClean="0">
-                              <a:solidFill>
-                                <a:schemeClr val="tx1"/>
-                              </a:solidFill>
-                              <a:latin typeface="Cambria Math" panose="02040503050406030204" pitchFamily="18" charset="0"/>
-                            </a:rPr>
-                            <m:t>𝑏</m:t>
-                          </m:r>
-                        </m:den>
-                      </m:f>
-                    </m:oMath>
-                  </m:oMathPara>
-                </a14:m>
-                <a:endParaRPr lang="es-ES" sz="900" dirty="0">
-                  <a:solidFill>
-                    <a:schemeClr val="tx1"/>
-                  </a:solidFill>
-                  <a:latin typeface="Arial" panose="020B0604020202020204" pitchFamily="34" charset="0"/>
-                  <a:cs typeface="Arial" panose="020B0604020202020204" pitchFamily="34" charset="0"/>
-                </a:endParaRPr>
-              </a:p>
-            </p:txBody>
-          </p:sp>
-        </mc:Choice>
-        <mc:Fallback>
-          <p:sp>
-            <p:nvSpPr>
-              <p:cNvPr id="369" name="Rectángulo 368" descr="Nodo de tercer nivel" title="Nodo03"/>
-              <p:cNvSpPr>
-                <a:spLocks noRot="1" noChangeAspect="1" noMove="1" noResize="1" noEditPoints="1" noAdjustHandles="1" noChangeArrowheads="1" noChangeShapeType="1" noTextEdit="1"/>
-              </p:cNvSpPr>
-              <p:nvPr/>
-            </p:nvSpPr>
-            <p:spPr>
-              <a:xfrm>
-                <a:off x="7582509" y="3386059"/>
-                <a:ext cx="494822" cy="343441"/>
-              </a:xfrm>
-              <a:prstGeom prst="rect">
-                <a:avLst/>
-              </a:prstGeom>
-              <a:blipFill rotWithShape="0">
-                <a:blip r:embed="rId3"/>
-                <a:stretch>
-                  <a:fillRect/>
-                </a:stretch>
-              </a:blipFill>
-              <a:ln>
-                <a:solidFill>
-                  <a:schemeClr val="tx1"/>
-                </a:solidFill>
-              </a:ln>
-            </p:spPr>
-            <p:txBody>
-              <a:bodyPr/>
-              <a:lstStyle/>
-              <a:p>
-                <a:r>
-                  <a:rPr lang="es-CO">
-                    <a:noFill/>
-                  </a:rPr>
-                  <a:t> </a:t>
-                </a:r>
-              </a:p>
-            </p:txBody>
-          </p:sp>
-        </mc:Fallback>
-      </mc:AlternateContent>
-      <mc:AlternateContent xmlns:mc="http://schemas.openxmlformats.org/markup-compatibility/2006">
-        <mc:Choice xmlns:a14="http://schemas.microsoft.com/office/drawing/2010/main" Requires="a14">
-          <p:sp>
-            <p:nvSpPr>
-              <p:cNvPr id="370" name="Rectángulo 369" descr="Nodo de tercer nivel" title="Nodo03"/>
-              <p:cNvSpPr/>
-              <p:nvPr/>
-            </p:nvSpPr>
-            <p:spPr>
-              <a:xfrm>
-                <a:off x="8224609" y="3373361"/>
-                <a:ext cx="515656" cy="343441"/>
-              </a:xfrm>
-              <a:prstGeom prst="rect">
-                <a:avLst/>
-              </a:prstGeom>
+              <a:latin typeface="Arial" panose="020B0604020202020204" pitchFamily="34" charset="0"/>
+              <a:cs typeface="Arial" panose="020B0604020202020204" pitchFamily="34" charset="0"/>
+            </a:endParaRPr>
+          </a:p>
+        </p:txBody>
+      </p:sp>
+      <p:sp>
+        <p:nvSpPr>
+          <p:cNvPr id="370" name="Rectángulo 369" descr="Nodo de tercer nivel" title="Nodo03"/>
+          <p:cNvSpPr/>
+          <p:nvPr/>
+        </p:nvSpPr>
+        <p:spPr>
+          <a:xfrm>
+            <a:off x="8224609" y="3373361"/>
+            <a:ext cx="515656" cy="343441"/>
+          </a:xfrm>
+          <a:prstGeom prst="rect">
+            <a:avLst/>
+          </a:prstGeom>
+          <a:solidFill>
+            <a:schemeClr val="bg2">
+              <a:lumMod val="90000"/>
+            </a:schemeClr>
+          </a:solidFill>
+          <a:ln>
+            <a:solidFill>
+              <a:schemeClr val="tx1"/>
+            </a:solidFill>
+          </a:ln>
+        </p:spPr>
+        <p:style>
+          <a:lnRef idx="2">
+            <a:schemeClr val="accent6"/>
+          </a:lnRef>
+          <a:fillRef idx="1">
+            <a:schemeClr val="lt1"/>
+          </a:fillRef>
+          <a:effectRef idx="0">
+            <a:schemeClr val="accent6"/>
+          </a:effectRef>
+          <a:fontRef idx="minor">
+            <a:schemeClr val="dk1"/>
+          </a:fontRef>
+        </p:style>
+        <p:txBody>
+          <a:bodyPr rtlCol="0" anchor="ctr"/>
+          <a:lstStyle/>
+          <a:p>
+            <a:pPr algn="ctr"/>
+            <a:endParaRPr lang="es-ES" sz="900" dirty="0">
               <a:solidFill>
-                <a:schemeClr val="bg2">
-                  <a:lumMod val="90000"/>
-                </a:schemeClr>
+                <a:schemeClr val="tx1"/>
               </a:solidFill>
-              <a:ln>
-                <a:solidFill>
-                  <a:schemeClr val="tx1"/>
-                </a:solidFill>
-              </a:ln>
-            </p:spPr>
-            <p:style>
-              <a:lnRef idx="2">
-                <a:schemeClr val="accent6"/>
-              </a:lnRef>
-              <a:fillRef idx="1">
-                <a:schemeClr val="lt1"/>
-              </a:fillRef>
-              <a:effectRef idx="0">
-                <a:schemeClr val="accent6"/>
-              </a:effectRef>
-              <a:fontRef idx="minor">
-                <a:schemeClr val="dk1"/>
-              </a:fontRef>
-            </p:style>
-            <p:txBody>
-              <a:bodyPr rtlCol="0" anchor="ctr"/>
-              <a:lstStyle/>
-              <a:p>
-                <a:pPr algn="ctr"/>
-                <a14:m>
-                  <m:oMathPara xmlns:m="http://schemas.openxmlformats.org/officeDocument/2006/math">
-                    <m:oMathParaPr>
-                      <m:jc m:val="centerGroup"/>
-                    </m:oMathParaPr>
-                    <m:oMath xmlns:m="http://schemas.openxmlformats.org/officeDocument/2006/math">
-                      <m:f>
-                        <m:fPr>
-                          <m:ctrlPr>
-                            <a:rPr lang="es-ES" sz="900" i="1" smtClean="0">
-                              <a:solidFill>
-                                <a:schemeClr val="tx1"/>
-                              </a:solidFill>
-                              <a:latin typeface="Cambria Math" panose="02040503050406030204" pitchFamily="18" charset="0"/>
-                            </a:rPr>
-                          </m:ctrlPr>
-                        </m:fPr>
-                        <m:num>
-                          <m:sSup>
-                            <m:sSupPr>
-                              <m:ctrlPr>
-                                <a:rPr lang="es-ES" sz="900" i="1" smtClean="0">
-                                  <a:solidFill>
-                                    <a:schemeClr val="tx1"/>
-                                  </a:solidFill>
-                                  <a:latin typeface="Cambria Math" panose="02040503050406030204" pitchFamily="18" charset="0"/>
-                                </a:rPr>
-                              </m:ctrlPr>
-                            </m:sSupPr>
-                            <m:e>
-                              <m:r>
-                                <a:rPr lang="es-CO" sz="900" b="0" i="1" smtClean="0">
-                                  <a:solidFill>
-                                    <a:schemeClr val="tx1"/>
-                                  </a:solidFill>
-                                  <a:latin typeface="Cambria Math" panose="02040503050406030204" pitchFamily="18" charset="0"/>
-                                </a:rPr>
-                                <m:t>𝑎</m:t>
-                              </m:r>
-                            </m:e>
-                            <m:sup>
-                              <m:r>
-                                <a:rPr lang="es-CO" sz="900" b="0" i="1" smtClean="0">
-                                  <a:solidFill>
-                                    <a:schemeClr val="tx1"/>
-                                  </a:solidFill>
-                                  <a:latin typeface="Cambria Math" panose="02040503050406030204" pitchFamily="18" charset="0"/>
-                                </a:rPr>
-                                <m:t>𝑛</m:t>
-                              </m:r>
-                            </m:sup>
-                          </m:sSup>
-                          <m:r>
-                            <a:rPr lang="es-CO" sz="900" b="0" i="1" smtClean="0">
-                              <a:solidFill>
-                                <a:schemeClr val="tx1"/>
-                              </a:solidFill>
-                              <a:latin typeface="Cambria Math" panose="02040503050406030204" pitchFamily="18" charset="0"/>
-                            </a:rPr>
-                            <m:t>+</m:t>
-                          </m:r>
-                          <m:sSup>
-                            <m:sSupPr>
-                              <m:ctrlPr>
-                                <a:rPr lang="es-CO" sz="900" b="0" i="1" smtClean="0">
-                                  <a:solidFill>
-                                    <a:schemeClr val="tx1"/>
-                                  </a:solidFill>
-                                  <a:latin typeface="Cambria Math" panose="02040503050406030204" pitchFamily="18" charset="0"/>
-                                </a:rPr>
-                              </m:ctrlPr>
-                            </m:sSupPr>
-                            <m:e>
-                              <m:r>
-                                <a:rPr lang="es-CO" sz="900" b="0" i="1" smtClean="0">
-                                  <a:solidFill>
-                                    <a:schemeClr val="tx1"/>
-                                  </a:solidFill>
-                                  <a:latin typeface="Cambria Math" panose="02040503050406030204" pitchFamily="18" charset="0"/>
-                                </a:rPr>
-                                <m:t>𝑏</m:t>
-                              </m:r>
-                            </m:e>
-                            <m:sup>
-                              <m:r>
-                                <a:rPr lang="es-CO" sz="900" b="0" i="1" smtClean="0">
-                                  <a:solidFill>
-                                    <a:schemeClr val="tx1"/>
-                                  </a:solidFill>
-                                  <a:latin typeface="Cambria Math" panose="02040503050406030204" pitchFamily="18" charset="0"/>
-                                </a:rPr>
-                                <m:t>𝑛</m:t>
-                              </m:r>
-                            </m:sup>
-                          </m:sSup>
-                        </m:num>
-                        <m:den>
-                          <m:r>
-                            <a:rPr lang="es-CO" sz="900" b="0" i="1" smtClean="0">
-                              <a:solidFill>
-                                <a:schemeClr val="tx1"/>
-                              </a:solidFill>
-                              <a:latin typeface="Cambria Math" panose="02040503050406030204" pitchFamily="18" charset="0"/>
-                            </a:rPr>
-                            <m:t>𝑎</m:t>
-                          </m:r>
-                          <m:r>
-                            <a:rPr lang="es-CO" sz="900" b="0" i="1" smtClean="0">
-                              <a:solidFill>
-                                <a:schemeClr val="tx1"/>
-                              </a:solidFill>
-                              <a:latin typeface="Cambria Math" panose="02040503050406030204" pitchFamily="18" charset="0"/>
-                            </a:rPr>
-                            <m:t>+</m:t>
-                          </m:r>
-                          <m:r>
-                            <a:rPr lang="es-CO" sz="900" b="0" i="1" smtClean="0">
-                              <a:solidFill>
-                                <a:schemeClr val="tx1"/>
-                              </a:solidFill>
-                              <a:latin typeface="Cambria Math" panose="02040503050406030204" pitchFamily="18" charset="0"/>
-                            </a:rPr>
-                            <m:t>𝑏</m:t>
-                          </m:r>
-                        </m:den>
-                      </m:f>
-                    </m:oMath>
-                  </m:oMathPara>
-                </a14:m>
-                <a:endParaRPr lang="es-ES" sz="900" dirty="0">
-                  <a:solidFill>
-                    <a:schemeClr val="tx1"/>
-                  </a:solidFill>
-                </a:endParaRPr>
-              </a:p>
-            </p:txBody>
-          </p:sp>
-        </mc:Choice>
-        <mc:Fallback>
-          <p:sp>
-            <p:nvSpPr>
-              <p:cNvPr id="370" name="Rectángulo 369" descr="Nodo de tercer nivel" title="Nodo03"/>
-              <p:cNvSpPr>
-                <a:spLocks noRot="1" noChangeAspect="1" noMove="1" noResize="1" noEditPoints="1" noAdjustHandles="1" noChangeArrowheads="1" noChangeShapeType="1" noTextEdit="1"/>
-              </p:cNvSpPr>
-              <p:nvPr/>
-            </p:nvSpPr>
-            <p:spPr>
-              <a:xfrm>
-                <a:off x="8224609" y="3373361"/>
-                <a:ext cx="515656" cy="343441"/>
-              </a:xfrm>
-              <a:prstGeom prst="rect">
-                <a:avLst/>
-              </a:prstGeom>
-              <a:blipFill rotWithShape="0">
-                <a:blip r:embed="rId4"/>
-                <a:stretch>
-                  <a:fillRect/>
-                </a:stretch>
-              </a:blipFill>
-              <a:ln>
-                <a:solidFill>
-                  <a:schemeClr val="tx1"/>
-                </a:solidFill>
-              </a:ln>
-            </p:spPr>
-            <p:txBody>
-              <a:bodyPr/>
-              <a:lstStyle/>
-              <a:p>
-                <a:r>
-                  <a:rPr lang="es-CO">
-                    <a:noFill/>
-                  </a:rPr>
-                  <a:t> </a:t>
-                </a:r>
-              </a:p>
-            </p:txBody>
-          </p:sp>
-        </mc:Fallback>
-      </mc:AlternateContent>
+            </a:endParaRPr>
+          </a:p>
+        </p:txBody>
+      </p:sp>
       <p:sp>
         <p:nvSpPr>
           <p:cNvPr id="378" name="Rectángulo 377" descr="Nodo de cuarto nivel&#10;" title="Nodo04"/>
@@ -2154,17 +1589,7 @@
                 <a:latin typeface="Arial" panose="020B0604020202020204" pitchFamily="34" charset="0"/>
                 <a:cs typeface="Arial" panose="020B0604020202020204" pitchFamily="34" charset="0"/>
               </a:rPr>
-              <a:t>se </a:t>
-            </a:r>
-            <a:r>
-              <a:rPr lang="es-ES" sz="800" dirty="0" smtClean="0">
-                <a:solidFill>
-                  <a:schemeClr val="tx1"/>
-                </a:solidFill>
-                <a:latin typeface="Arial" panose="020B0604020202020204" pitchFamily="34" charset="0"/>
-                <a:cs typeface="Arial" panose="020B0604020202020204" pitchFamily="34" charset="0"/>
-              </a:rPr>
-              <a:t>cumple si </a:t>
+              <a:t>se cumple si </a:t>
             </a:r>
             <a:r>
               <a:rPr lang="es-ES" sz="800" i="1" dirty="0" smtClean="0">
@@ -2245,17 +1670,7 @@
                 <a:latin typeface="Arial" panose="020B0604020202020204" pitchFamily="34" charset="0"/>
                 <a:cs typeface="Arial" panose="020B0604020202020204" pitchFamily="34" charset="0"/>
               </a:rPr>
-              <a:t>solo </a:t>
-            </a:r>
-            <a:r>
-              <a:rPr lang="es-ES" sz="800" dirty="0" smtClean="0">
-                <a:solidFill>
-                  <a:schemeClr val="tx1"/>
-                </a:solidFill>
-                <a:latin typeface="Arial" panose="020B0604020202020204" pitchFamily="34" charset="0"/>
-                <a:cs typeface="Arial" panose="020B0604020202020204" pitchFamily="34" charset="0"/>
-              </a:rPr>
-              <a:t>se cumple si </a:t>
+              <a:t>solo se cumple si </a:t>
             </a:r>
             <a:r>
               <a:rPr lang="es-ES" sz="800" i="1" dirty="0" smtClean="0">
@@ -2275,17 +1690,7 @@
                 <a:latin typeface="Arial" panose="020B0604020202020204" pitchFamily="34" charset="0"/>
                 <a:cs typeface="Arial" panose="020B0604020202020204" pitchFamily="34" charset="0"/>
               </a:rPr>
-              <a:t> es un número </a:t>
-            </a:r>
-            <a:r>
-              <a:rPr lang="es-ES" sz="800" dirty="0" smtClean="0">
-                <a:solidFill>
-                  <a:schemeClr val="tx1"/>
-                </a:solidFill>
-                <a:latin typeface="Arial" panose="020B0604020202020204" pitchFamily="34" charset="0"/>
-                <a:cs typeface="Arial" panose="020B0604020202020204" pitchFamily="34" charset="0"/>
-              </a:rPr>
-              <a:t>impar</a:t>
+              <a:t> es un número impar</a:t>
             </a:r>
             <a:endParaRPr lang="es-ES" sz="900" dirty="0">
               <a:solidFill>
@@ -2525,27 +1930,7 @@
                 <a:latin typeface="Arial" panose="020B0604020202020204" pitchFamily="34" charset="0"/>
                 <a:cs typeface="Arial" panose="020B0604020202020204" pitchFamily="34" charset="0"/>
               </a:rPr>
-              <a:t>cuadrado </a:t>
-            </a:r>
-            <a:r>
-              <a:rPr lang="es-ES" sz="900" dirty="0" smtClean="0">
-                <a:solidFill>
-                  <a:schemeClr val="tx1"/>
-                </a:solidFill>
-                <a:latin typeface="Arial" panose="020B0604020202020204" pitchFamily="34" charset="0"/>
-                <a:cs typeface="Arial" panose="020B0604020202020204" pitchFamily="34" charset="0"/>
-              </a:rPr>
-              <a:t>de un </a:t>
-            </a:r>
-            <a:r>
-              <a:rPr lang="es-ES" sz="900" dirty="0" smtClean="0">
-                <a:solidFill>
-                  <a:schemeClr val="tx1"/>
-                </a:solidFill>
-                <a:latin typeface="Arial" panose="020B0604020202020204" pitchFamily="34" charset="0"/>
-                <a:cs typeface="Arial" panose="020B0604020202020204" pitchFamily="34" charset="0"/>
-              </a:rPr>
-              <a:t>trinomio</a:t>
+              <a:t>cuadrado de un trinomio</a:t>
             </a:r>
             <a:endParaRPr lang="es-ES" sz="900" dirty="0">
               <a:solidFill>
@@ -2609,35 +1994,8 @@
                 <a:latin typeface="Arial" panose="020B0604020202020204" pitchFamily="34" charset="0"/>
                 <a:cs typeface="Arial" panose="020B0604020202020204" pitchFamily="34" charset="0"/>
               </a:rPr>
-              <a:t>producto </a:t>
+              <a:t>producto de la suma por la diferencia</a:t>
             </a:r>
-            <a:r>
-              <a:rPr lang="es-ES" sz="900" dirty="0" smtClean="0">
-                <a:solidFill>
-                  <a:schemeClr val="tx1"/>
-                </a:solidFill>
-                <a:latin typeface="Arial" panose="020B0604020202020204" pitchFamily="34" charset="0"/>
-                <a:cs typeface="Arial" panose="020B0604020202020204" pitchFamily="34" charset="0"/>
-              </a:rPr>
-              <a:t>de la suma por la </a:t>
-            </a:r>
-            <a:r>
-              <a:rPr lang="es-ES" sz="900" dirty="0" smtClean="0">
-                <a:solidFill>
-                  <a:schemeClr val="tx1"/>
-                </a:solidFill>
-                <a:latin typeface="Arial" panose="020B0604020202020204" pitchFamily="34" charset="0"/>
-                <a:cs typeface="Arial" panose="020B0604020202020204" pitchFamily="34" charset="0"/>
-              </a:rPr>
-              <a:t>diferencia</a:t>
-            </a:r>
-            <a:endParaRPr lang="es-ES" sz="900" dirty="0" smtClean="0">
-              <a:solidFill>
-                <a:schemeClr val="tx1"/>
-              </a:solidFill>
-              <a:latin typeface="Arial" panose="020B0604020202020204" pitchFamily="34" charset="0"/>
-              <a:cs typeface="Arial" panose="020B0604020202020204" pitchFamily="34" charset="0"/>
-            </a:endParaRPr>
           </a:p>
         </p:txBody>
       </p:sp>
@@ -2693,17 +2051,7 @@
                 <a:latin typeface="Arial" panose="020B0604020202020204" pitchFamily="34" charset="0"/>
                 <a:cs typeface="Arial" panose="020B0604020202020204" pitchFamily="34" charset="0"/>
               </a:rPr>
-              <a:t>producto </a:t>
-            </a:r>
-            <a:r>
-              <a:rPr lang="es-ES" sz="900" dirty="0" smtClean="0">
-                <a:solidFill>
-                  <a:schemeClr val="tx1"/>
-                </a:solidFill>
-                <a:latin typeface="Arial" panose="020B0604020202020204" pitchFamily="34" charset="0"/>
-                <a:cs typeface="Arial" panose="020B0604020202020204" pitchFamily="34" charset="0"/>
-              </a:rPr>
-              <a:t>de dos binomios </a:t>
+              <a:t>producto de dos binomios </a:t>
             </a:r>
           </a:p>
           <a:p>
@@ -2803,17 +2151,7 @@
                 <a:latin typeface="Arial" panose="020B0604020202020204" pitchFamily="34" charset="0"/>
                 <a:cs typeface="Arial" panose="020B0604020202020204" pitchFamily="34" charset="0"/>
               </a:rPr>
-              <a:t>el </a:t>
-            </a:r>
-            <a:r>
-              <a:rPr lang="es-ES" sz="900" dirty="0" smtClean="0">
-                <a:solidFill>
-                  <a:schemeClr val="tx1"/>
-                </a:solidFill>
-                <a:latin typeface="Arial" panose="020B0604020202020204" pitchFamily="34" charset="0"/>
-                <a:cs typeface="Arial" panose="020B0604020202020204" pitchFamily="34" charset="0"/>
-              </a:rPr>
-              <a:t>cubo de un binomio</a:t>
+              <a:t>el cubo de un binomio</a:t>
             </a:r>
           </a:p>
           <a:p>
@@ -2966,17 +2304,7 @@
                 <a:latin typeface="Arial" panose="020B0604020202020204" pitchFamily="34" charset="0"/>
                 <a:cs typeface="Arial" panose="020B0604020202020204" pitchFamily="34" charset="0"/>
               </a:rPr>
-              <a:t>multiplicaciones </a:t>
-            </a:r>
-            <a:r>
-              <a:rPr lang="es-ES" sz="1050" dirty="0" smtClean="0">
-                <a:solidFill>
-                  <a:schemeClr val="bg1"/>
-                </a:solidFill>
-                <a:latin typeface="Arial" panose="020B0604020202020204" pitchFamily="34" charset="0"/>
-                <a:cs typeface="Arial" panose="020B0604020202020204" pitchFamily="34" charset="0"/>
-              </a:rPr>
-              <a:t>especiales que permiten generalizar sus resultados</a:t>
+              <a:t>multiplicaciones especiales que permiten generalizar sus resultados</a:t>
             </a:r>
             <a:endParaRPr lang="es-ES" sz="1050" dirty="0">
               <a:solidFill>
@@ -3016,14 +2344,7 @@
                 <a:latin typeface="Arial" panose="020B0604020202020204" pitchFamily="34" charset="0"/>
                 <a:cs typeface="Arial" panose="020B0604020202020204" pitchFamily="34" charset="0"/>
               </a:rPr>
-              <a:t>se </a:t>
-            </a:r>
-            <a:r>
-              <a:rPr lang="es-ES" sz="800" dirty="0" smtClean="0">
-                <a:latin typeface="Arial" panose="020B0604020202020204" pitchFamily="34" charset="0"/>
-                <a:cs typeface="Arial" panose="020B0604020202020204" pitchFamily="34" charset="0"/>
-              </a:rPr>
-              <a:t>establece</a:t>
+              <a:t>se establece</a:t>
             </a:r>
             <a:endParaRPr lang="es-ES" sz="800" dirty="0">
               <a:latin typeface="Arial" panose="020B0604020202020204" pitchFamily="34" charset="0"/>
@@ -3085,17 +2406,7 @@
                 <a:latin typeface="Arial" panose="020B0604020202020204" pitchFamily="34" charset="0"/>
                 <a:cs typeface="Arial" panose="020B0604020202020204" pitchFamily="34" charset="0"/>
               </a:rPr>
-              <a:t>el teorema </a:t>
-            </a:r>
-            <a:r>
-              <a:rPr lang="es-ES" sz="1050" dirty="0" smtClean="0">
-                <a:solidFill>
-                  <a:schemeClr val="bg1"/>
-                </a:solidFill>
-                <a:latin typeface="Arial" panose="020B0604020202020204" pitchFamily="34" charset="0"/>
-                <a:cs typeface="Arial" panose="020B0604020202020204" pitchFamily="34" charset="0"/>
-              </a:rPr>
-              <a:t>del binomio</a:t>
+              <a:t>el teorema del binomio</a:t>
             </a:r>
             <a:endParaRPr lang="es-ES" sz="1050" dirty="0">
               <a:solidFill>
@@ -3152,8 +2463,8 @@
         </p:nvSpPr>
         <p:spPr>
           <a:xfrm>
-            <a:off x="5577492" y="2715677"/>
-            <a:ext cx="919393" cy="342189"/>
+            <a:off x="5577492" y="2715678"/>
+            <a:ext cx="986980" cy="336552"/>
           </a:xfrm>
           <a:prstGeom prst="rect">
             <a:avLst/>
@@ -3206,57 +2517,40 @@
                 <a:latin typeface="Arial" panose="020B0604020202020204" pitchFamily="34" charset="0"/>
                 <a:cs typeface="Arial" panose="020B0604020202020204" pitchFamily="34" charset="0"/>
               </a:rPr>
-              <a:t>a expansión de (</a:t>
+              <a:t>a expansión </a:t>
             </a:r>
             <a:r>
-              <a:rPr lang="es-CO" sz="900" i="1" dirty="0" smtClean="0">
+              <a:rPr lang="es-ES" sz="900" dirty="0" smtClean="0">
                 <a:solidFill>
                   <a:schemeClr val="tx1"/>
                 </a:solidFill>
                 <a:latin typeface="Arial" panose="020B0604020202020204" pitchFamily="34" charset="0"/>
                 <a:cs typeface="Arial" panose="020B0604020202020204" pitchFamily="34" charset="0"/>
               </a:rPr>
-              <a:t>a</a:t>
+              <a:t>de</a:t>
             </a:r>
+          </a:p>
+          <a:p>
+            <a:pPr algn="ctr"/>
+            <a:endParaRPr lang="es-ES" sz="900" dirty="0" smtClean="0">
+              <a:solidFill>
+                <a:schemeClr val="tx1"/>
+              </a:solidFill>
+              <a:latin typeface="Arial" panose="020B0604020202020204" pitchFamily="34" charset="0"/>
+              <a:cs typeface="Arial" panose="020B0604020202020204" pitchFamily="34" charset="0"/>
+            </a:endParaRPr>
+          </a:p>
+          <a:p>
+            <a:pPr algn="ctr"/>
             <a:r>
-              <a:rPr lang="es-CO" sz="900" dirty="0" smtClean="0">
+              <a:rPr lang="es-ES" sz="900" dirty="0" smtClean="0">
                 <a:solidFill>
                   <a:schemeClr val="tx1"/>
                 </a:solidFill>
                 <a:latin typeface="Arial" panose="020B0604020202020204" pitchFamily="34" charset="0"/>
                 <a:cs typeface="Arial" panose="020B0604020202020204" pitchFamily="34" charset="0"/>
               </a:rPr>
-              <a:t> + </a:t>
-            </a:r>
-            <a:r>
-              <a:rPr lang="es-CO" sz="900" i="1" dirty="0" smtClean="0">
-                <a:solidFill>
-                  <a:schemeClr val="tx1"/>
-                </a:solidFill>
-                <a:latin typeface="Arial" panose="020B0604020202020204" pitchFamily="34" charset="0"/>
-                <a:cs typeface="Arial" panose="020B0604020202020204" pitchFamily="34" charset="0"/>
-              </a:rPr>
-              <a:t>b</a:t>
-            </a:r>
-            <a:r>
-              <a:rPr lang="es-CO" sz="900" dirty="0" smtClean="0">
-                <a:solidFill>
-                  <a:schemeClr val="tx1"/>
-                </a:solidFill>
-                <a:latin typeface="Arial" panose="020B0604020202020204" pitchFamily="34" charset="0"/>
-                <a:cs typeface="Arial" panose="020B0604020202020204" pitchFamily="34" charset="0"/>
-              </a:rPr>
-              <a:t>)</a:t>
-            </a:r>
-            <a:r>
-              <a:rPr lang="es-CO" sz="900" i="1" baseline="30000" dirty="0" smtClean="0">
-                <a:solidFill>
-                  <a:schemeClr val="tx1"/>
-                </a:solidFill>
-                <a:latin typeface="Arial" panose="020B0604020202020204" pitchFamily="34" charset="0"/>
-                <a:cs typeface="Arial" panose="020B0604020202020204" pitchFamily="34" charset="0"/>
-              </a:rPr>
-              <a:t>n</a:t>
+              <a:t> </a:t>
             </a:r>
             <a:endParaRPr lang="es-ES" sz="900" i="1" baseline="30000" dirty="0">
               <a:solidFill>
@@ -3296,14 +2590,7 @@
                 <a:latin typeface="Arial" panose="020B0604020202020204" pitchFamily="34" charset="0"/>
                 <a:cs typeface="Arial" panose="020B0604020202020204" pitchFamily="34" charset="0"/>
               </a:rPr>
-              <a:t>se </a:t>
-            </a:r>
-            <a:r>
-              <a:rPr lang="es-ES" sz="800" dirty="0" smtClean="0">
-                <a:latin typeface="Arial" panose="020B0604020202020204" pitchFamily="34" charset="0"/>
-                <a:cs typeface="Arial" panose="020B0604020202020204" pitchFamily="34" charset="0"/>
-              </a:rPr>
-              <a:t>desarrolla usando</a:t>
+              <a:t>se desarrolla usando</a:t>
             </a:r>
             <a:endParaRPr lang="es-ES" sz="800" dirty="0">
               <a:latin typeface="Arial" panose="020B0604020202020204" pitchFamily="34" charset="0"/>
@@ -3400,21 +2687,7 @@
                 <a:latin typeface="Arial" panose="020B0604020202020204" pitchFamily="34" charset="0"/>
                 <a:cs typeface="Arial" panose="020B0604020202020204" pitchFamily="34" charset="0"/>
               </a:rPr>
-              <a:t>algunas </a:t>
-            </a:r>
-            <a:r>
-              <a:rPr lang="es-ES" sz="800" dirty="0" smtClean="0">
-                <a:latin typeface="Arial" panose="020B0604020202020204" pitchFamily="34" charset="0"/>
-                <a:cs typeface="Arial" panose="020B0604020202020204" pitchFamily="34" charset="0"/>
-              </a:rPr>
-              <a:t>características </a:t>
-            </a:r>
-            <a:r>
-              <a:rPr lang="es-ES" sz="800" dirty="0" smtClean="0">
-                <a:latin typeface="Arial" panose="020B0604020202020204" pitchFamily="34" charset="0"/>
-                <a:cs typeface="Arial" panose="020B0604020202020204" pitchFamily="34" charset="0"/>
-              </a:rPr>
-              <a:t>son</a:t>
+              <a:t>algunas características son</a:t>
             </a:r>
             <a:endParaRPr lang="es-ES" sz="800" dirty="0">
               <a:latin typeface="Arial" panose="020B0604020202020204" pitchFamily="34" charset="0"/>
@@ -3474,75 +2747,8 @@
                 <a:latin typeface="Arial" panose="020B0604020202020204" pitchFamily="34" charset="0"/>
                 <a:cs typeface="Arial" panose="020B0604020202020204" pitchFamily="34" charset="0"/>
               </a:rPr>
-              <a:t>cada </a:t>
+              <a:t>cada término es la suma  de los dos términos de la fila anterior.</a:t>
             </a:r>
-            <a:r>
-              <a:rPr lang="es-ES" sz="800" dirty="0" smtClean="0">
-                <a:solidFill>
-                  <a:schemeClr val="tx1"/>
-                </a:solidFill>
-                <a:latin typeface="Arial" panose="020B0604020202020204" pitchFamily="34" charset="0"/>
-                <a:cs typeface="Arial" panose="020B0604020202020204" pitchFamily="34" charset="0"/>
-              </a:rPr>
-              <a:t>término </a:t>
-            </a:r>
-            <a:r>
-              <a:rPr lang="es-ES" sz="800" dirty="0" smtClean="0">
-                <a:solidFill>
-                  <a:schemeClr val="tx1"/>
-                </a:solidFill>
-                <a:latin typeface="Arial" panose="020B0604020202020204" pitchFamily="34" charset="0"/>
-                <a:cs typeface="Arial" panose="020B0604020202020204" pitchFamily="34" charset="0"/>
-              </a:rPr>
-              <a:t>es la suma  </a:t>
-            </a:r>
-            <a:r>
-              <a:rPr lang="es-ES" sz="800" dirty="0" smtClean="0">
-                <a:solidFill>
-                  <a:schemeClr val="tx1"/>
-                </a:solidFill>
-                <a:latin typeface="Arial" panose="020B0604020202020204" pitchFamily="34" charset="0"/>
-                <a:cs typeface="Arial" panose="020B0604020202020204" pitchFamily="34" charset="0"/>
-              </a:rPr>
-              <a:t>de los dos </a:t>
-            </a:r>
-            <a:r>
-              <a:rPr lang="es-ES" sz="800" dirty="0" smtClean="0">
-                <a:solidFill>
-                  <a:schemeClr val="tx1"/>
-                </a:solidFill>
-                <a:latin typeface="Arial" panose="020B0604020202020204" pitchFamily="34" charset="0"/>
-                <a:cs typeface="Arial" panose="020B0604020202020204" pitchFamily="34" charset="0"/>
-              </a:rPr>
-              <a:t>términos </a:t>
-            </a:r>
-            <a:r>
-              <a:rPr lang="es-ES" sz="800" dirty="0" smtClean="0">
-                <a:solidFill>
-                  <a:schemeClr val="tx1"/>
-                </a:solidFill>
-                <a:latin typeface="Arial" panose="020B0604020202020204" pitchFamily="34" charset="0"/>
-                <a:cs typeface="Arial" panose="020B0604020202020204" pitchFamily="34" charset="0"/>
-              </a:rPr>
-              <a:t>de la fila </a:t>
-            </a:r>
-            <a:r>
-              <a:rPr lang="es-ES" sz="800" dirty="0" smtClean="0">
-                <a:solidFill>
-                  <a:schemeClr val="tx1"/>
-                </a:solidFill>
-                <a:latin typeface="Arial" panose="020B0604020202020204" pitchFamily="34" charset="0"/>
-                <a:cs typeface="Arial" panose="020B0604020202020204" pitchFamily="34" charset="0"/>
-              </a:rPr>
-              <a:t>anterior.</a:t>
-            </a:r>
-            <a:endParaRPr lang="es-ES" sz="800" dirty="0" smtClean="0">
-              <a:solidFill>
-                <a:schemeClr val="tx1"/>
-              </a:solidFill>
-              <a:latin typeface="Arial" panose="020B0604020202020204" pitchFamily="34" charset="0"/>
-              <a:cs typeface="Arial" panose="020B0604020202020204" pitchFamily="34" charset="0"/>
-            </a:endParaRPr>
           </a:p>
           <a:p>
             <a:pPr marL="171450" indent="-171450">
@@ -3557,35 +2763,8 @@
                 <a:latin typeface="Arial" panose="020B0604020202020204" pitchFamily="34" charset="0"/>
                 <a:cs typeface="Arial" panose="020B0604020202020204" pitchFamily="34" charset="0"/>
               </a:rPr>
-              <a:t>si </a:t>
+              <a:t>si es la potencia de una suma todos los signos son positivos</a:t>
             </a:r>
-            <a:r>
-              <a:rPr lang="es-ES" sz="800" dirty="0" smtClean="0">
-                <a:solidFill>
-                  <a:schemeClr val="tx1"/>
-                </a:solidFill>
-                <a:latin typeface="Arial" panose="020B0604020202020204" pitchFamily="34" charset="0"/>
-                <a:cs typeface="Arial" panose="020B0604020202020204" pitchFamily="34" charset="0"/>
-              </a:rPr>
-              <a:t>es la potencia de una suma todos los signos </a:t>
-            </a:r>
-            <a:r>
-              <a:rPr lang="es-ES" sz="800" dirty="0" smtClean="0">
-                <a:solidFill>
-                  <a:schemeClr val="tx1"/>
-                </a:solidFill>
-                <a:latin typeface="Arial" panose="020B0604020202020204" pitchFamily="34" charset="0"/>
-                <a:cs typeface="Arial" panose="020B0604020202020204" pitchFamily="34" charset="0"/>
-              </a:rPr>
-              <a:t>son positivos</a:t>
-            </a:r>
-            <a:endParaRPr lang="es-ES" sz="800" dirty="0" smtClean="0">
-              <a:solidFill>
-                <a:schemeClr val="tx1"/>
-              </a:solidFill>
-              <a:latin typeface="Arial" panose="020B0604020202020204" pitchFamily="34" charset="0"/>
-              <a:cs typeface="Arial" panose="020B0604020202020204" pitchFamily="34" charset="0"/>
-            </a:endParaRPr>
           </a:p>
           <a:p>
             <a:pPr marL="171450" indent="-171450">
@@ -3600,27 +2779,7 @@
                 <a:latin typeface="Arial" panose="020B0604020202020204" pitchFamily="34" charset="0"/>
                 <a:cs typeface="Arial" panose="020B0604020202020204" pitchFamily="34" charset="0"/>
               </a:rPr>
-              <a:t>si </a:t>
-            </a:r>
-            <a:r>
-              <a:rPr lang="es-ES" sz="800" dirty="0" smtClean="0">
-                <a:solidFill>
-                  <a:schemeClr val="tx1"/>
-                </a:solidFill>
-                <a:latin typeface="Arial" panose="020B0604020202020204" pitchFamily="34" charset="0"/>
-                <a:cs typeface="Arial" panose="020B0604020202020204" pitchFamily="34" charset="0"/>
-              </a:rPr>
-              <a:t>es la potencia de una diferencia los signos van </a:t>
-            </a:r>
-            <a:r>
-              <a:rPr lang="es-ES" sz="800" dirty="0" smtClean="0">
-                <a:solidFill>
-                  <a:schemeClr val="tx1"/>
-                </a:solidFill>
-                <a:latin typeface="Arial" panose="020B0604020202020204" pitchFamily="34" charset="0"/>
-                <a:cs typeface="Arial" panose="020B0604020202020204" pitchFamily="34" charset="0"/>
-              </a:rPr>
-              <a:t>intercalados</a:t>
+              <a:t>si es la potencia de una diferencia los signos van intercalados</a:t>
             </a:r>
             <a:endParaRPr lang="es-ES" sz="800" dirty="0">
               <a:solidFill>
@@ -4315,7 +3474,7 @@
         </p:nvSpPr>
         <p:spPr>
           <a:xfrm>
-            <a:off x="1453104" y="4041562"/>
+            <a:off x="1382417" y="4077341"/>
             <a:ext cx="838459" cy="215444"/>
           </a:xfrm>
           <a:prstGeom prst="rect">
@@ -4458,309 +3617,6 @@
           <a:lstStyle/>
           <a:p>
             <a:pPr algn="ctr"/>
-            <a:r>
-              <a:rPr lang="es-ES" sz="800" dirty="0" smtClean="0">
-                <a:solidFill>
-                  <a:schemeClr val="tx1"/>
-                </a:solidFill>
-                <a:latin typeface="Arial" panose="020B0604020202020204" pitchFamily="34" charset="0"/>
-                <a:cs typeface="Arial" panose="020B0604020202020204" pitchFamily="34" charset="0"/>
-              </a:rPr>
-              <a:t>(</a:t>
-            </a:r>
-            <a:r>
-              <a:rPr lang="es-ES" sz="800" i="1" dirty="0" smtClean="0">
-                <a:solidFill>
-                  <a:schemeClr val="tx1"/>
-                </a:solidFill>
-                <a:latin typeface="Arial" panose="020B0604020202020204" pitchFamily="34" charset="0"/>
-                <a:cs typeface="Arial" panose="020B0604020202020204" pitchFamily="34" charset="0"/>
-              </a:rPr>
-              <a:t>a</a:t>
-            </a:r>
-            <a:r>
-              <a:rPr lang="es-ES" sz="800" dirty="0" smtClean="0">
-                <a:solidFill>
-                  <a:schemeClr val="tx1"/>
-                </a:solidFill>
-                <a:latin typeface="Arial" panose="020B0604020202020204" pitchFamily="34" charset="0"/>
-                <a:cs typeface="Arial" panose="020B0604020202020204" pitchFamily="34" charset="0"/>
-              </a:rPr>
-              <a:t> + </a:t>
-            </a:r>
-            <a:r>
-              <a:rPr lang="es-ES" sz="800" i="1" dirty="0" smtClean="0">
-                <a:solidFill>
-                  <a:schemeClr val="tx1"/>
-                </a:solidFill>
-                <a:latin typeface="Arial" panose="020B0604020202020204" pitchFamily="34" charset="0"/>
-                <a:cs typeface="Arial" panose="020B0604020202020204" pitchFamily="34" charset="0"/>
-              </a:rPr>
-              <a:t>b</a:t>
-            </a:r>
-            <a:r>
-              <a:rPr lang="es-ES" sz="800" dirty="0" smtClean="0">
-                <a:solidFill>
-                  <a:schemeClr val="tx1"/>
-                </a:solidFill>
-                <a:latin typeface="Arial" panose="020B0604020202020204" pitchFamily="34" charset="0"/>
-                <a:cs typeface="Arial" panose="020B0604020202020204" pitchFamily="34" charset="0"/>
-              </a:rPr>
-              <a:t>)</a:t>
-            </a:r>
-            <a:r>
-              <a:rPr lang="es-ES" sz="800" baseline="30000" dirty="0" smtClean="0">
-                <a:solidFill>
-                  <a:schemeClr val="tx1"/>
-                </a:solidFill>
-                <a:latin typeface="Arial" panose="020B0604020202020204" pitchFamily="34" charset="0"/>
-                <a:cs typeface="Arial" panose="020B0604020202020204" pitchFamily="34" charset="0"/>
-              </a:rPr>
-              <a:t>2</a:t>
-            </a:r>
-            <a:r>
-              <a:rPr lang="es-ES" sz="800" dirty="0" smtClean="0">
-                <a:solidFill>
-                  <a:schemeClr val="tx1"/>
-                </a:solidFill>
-                <a:latin typeface="Arial" panose="020B0604020202020204" pitchFamily="34" charset="0"/>
-                <a:cs typeface="Arial" panose="020B0604020202020204" pitchFamily="34" charset="0"/>
-              </a:rPr>
-              <a:t> = </a:t>
-            </a:r>
-            <a:r>
-              <a:rPr lang="es-ES" sz="800" i="1" dirty="0" smtClean="0">
-                <a:solidFill>
-                  <a:schemeClr val="tx1"/>
-                </a:solidFill>
-                <a:latin typeface="Arial" panose="020B0604020202020204" pitchFamily="34" charset="0"/>
-                <a:cs typeface="Arial" panose="020B0604020202020204" pitchFamily="34" charset="0"/>
-              </a:rPr>
-              <a:t>a</a:t>
-            </a:r>
-            <a:r>
-              <a:rPr lang="es-ES" sz="800" baseline="30000" dirty="0" smtClean="0">
-                <a:solidFill>
-                  <a:schemeClr val="tx1"/>
-                </a:solidFill>
-                <a:latin typeface="Arial" panose="020B0604020202020204" pitchFamily="34" charset="0"/>
-                <a:cs typeface="Arial" panose="020B0604020202020204" pitchFamily="34" charset="0"/>
-              </a:rPr>
-              <a:t>2</a:t>
-            </a:r>
-            <a:r>
-              <a:rPr lang="es-ES" sz="800" dirty="0" smtClean="0">
-                <a:solidFill>
-                  <a:schemeClr val="tx1"/>
-                </a:solidFill>
-                <a:latin typeface="Arial" panose="020B0604020202020204" pitchFamily="34" charset="0"/>
-                <a:cs typeface="Arial" panose="020B0604020202020204" pitchFamily="34" charset="0"/>
-              </a:rPr>
-              <a:t> + 2</a:t>
-            </a:r>
-            <a:r>
-              <a:rPr lang="es-ES" sz="800" i="1" dirty="0" smtClean="0">
-                <a:solidFill>
-                  <a:schemeClr val="tx1"/>
-                </a:solidFill>
-                <a:latin typeface="Arial" panose="020B0604020202020204" pitchFamily="34" charset="0"/>
-                <a:cs typeface="Arial" panose="020B0604020202020204" pitchFamily="34" charset="0"/>
-              </a:rPr>
-              <a:t>ab</a:t>
-            </a:r>
-            <a:r>
-              <a:rPr lang="es-ES" sz="800" dirty="0" smtClean="0">
-                <a:solidFill>
-                  <a:schemeClr val="tx1"/>
-                </a:solidFill>
-                <a:latin typeface="Arial" panose="020B0604020202020204" pitchFamily="34" charset="0"/>
-                <a:cs typeface="Arial" panose="020B0604020202020204" pitchFamily="34" charset="0"/>
-              </a:rPr>
-              <a:t> + </a:t>
-            </a:r>
-            <a:r>
-              <a:rPr lang="es-ES" sz="800" i="1" dirty="0" smtClean="0">
-                <a:solidFill>
-                  <a:schemeClr val="tx1"/>
-                </a:solidFill>
-                <a:latin typeface="Arial" panose="020B0604020202020204" pitchFamily="34" charset="0"/>
-                <a:cs typeface="Arial" panose="020B0604020202020204" pitchFamily="34" charset="0"/>
-              </a:rPr>
-              <a:t>b</a:t>
-            </a:r>
-            <a:r>
-              <a:rPr lang="es-ES" sz="800" baseline="30000" dirty="0" smtClean="0">
-                <a:solidFill>
-                  <a:schemeClr val="tx1"/>
-                </a:solidFill>
-                <a:latin typeface="Arial" panose="020B0604020202020204" pitchFamily="34" charset="0"/>
-                <a:cs typeface="Arial" panose="020B0604020202020204" pitchFamily="34" charset="0"/>
-              </a:rPr>
-              <a:t>2</a:t>
-            </a:r>
-          </a:p>
-          <a:p>
-            <a:pPr algn="ctr"/>
-            <a:r>
-              <a:rPr lang="es-ES" sz="800" dirty="0">
-                <a:solidFill>
-                  <a:schemeClr val="tx1"/>
-                </a:solidFill>
-                <a:latin typeface="Arial" panose="020B0604020202020204" pitchFamily="34" charset="0"/>
-                <a:cs typeface="Arial" panose="020B0604020202020204" pitchFamily="34" charset="0"/>
-              </a:rPr>
-              <a:t>(</a:t>
-            </a:r>
-            <a:r>
-              <a:rPr lang="es-ES" sz="800" i="1" dirty="0" smtClean="0">
-                <a:solidFill>
-                  <a:schemeClr val="tx1"/>
-                </a:solidFill>
-                <a:latin typeface="Arial" panose="020B0604020202020204" pitchFamily="34" charset="0"/>
-                <a:cs typeface="Arial" panose="020B0604020202020204" pitchFamily="34" charset="0"/>
-              </a:rPr>
-              <a:t>a</a:t>
-            </a:r>
-            <a:r>
-              <a:rPr lang="es-ES" sz="800" dirty="0" smtClean="0">
-                <a:solidFill>
-                  <a:schemeClr val="tx1"/>
-                </a:solidFill>
-                <a:latin typeface="Arial" panose="020B0604020202020204" pitchFamily="34" charset="0"/>
-                <a:cs typeface="Arial" panose="020B0604020202020204" pitchFamily="34" charset="0"/>
-              </a:rPr>
-              <a:t> – </a:t>
-            </a:r>
-            <a:r>
-              <a:rPr lang="es-ES" sz="800" i="1" dirty="0">
-                <a:solidFill>
-                  <a:schemeClr val="tx1"/>
-                </a:solidFill>
-                <a:latin typeface="Arial" panose="020B0604020202020204" pitchFamily="34" charset="0"/>
-                <a:cs typeface="Arial" panose="020B0604020202020204" pitchFamily="34" charset="0"/>
-              </a:rPr>
-              <a:t>b</a:t>
-            </a:r>
-            <a:r>
-              <a:rPr lang="es-ES" sz="800" dirty="0">
-                <a:solidFill>
-                  <a:schemeClr val="tx1"/>
-                </a:solidFill>
-                <a:latin typeface="Arial" panose="020B0604020202020204" pitchFamily="34" charset="0"/>
-                <a:cs typeface="Arial" panose="020B0604020202020204" pitchFamily="34" charset="0"/>
-              </a:rPr>
-              <a:t>)</a:t>
-            </a:r>
-            <a:r>
-              <a:rPr lang="es-ES" sz="800" baseline="30000" dirty="0">
-                <a:solidFill>
-                  <a:schemeClr val="tx1"/>
-                </a:solidFill>
-                <a:latin typeface="Arial" panose="020B0604020202020204" pitchFamily="34" charset="0"/>
-                <a:cs typeface="Arial" panose="020B0604020202020204" pitchFamily="34" charset="0"/>
-              </a:rPr>
-              <a:t>2</a:t>
-            </a:r>
-            <a:r>
-              <a:rPr lang="es-ES" sz="800" dirty="0">
-                <a:solidFill>
-                  <a:schemeClr val="tx1"/>
-                </a:solidFill>
-                <a:latin typeface="Arial" panose="020B0604020202020204" pitchFamily="34" charset="0"/>
-                <a:cs typeface="Arial" panose="020B0604020202020204" pitchFamily="34" charset="0"/>
-              </a:rPr>
-              <a:t> = </a:t>
-            </a:r>
-            <a:r>
-              <a:rPr lang="es-ES" sz="800" i="1" dirty="0">
-                <a:solidFill>
-                  <a:schemeClr val="tx1"/>
-                </a:solidFill>
-                <a:latin typeface="Arial" panose="020B0604020202020204" pitchFamily="34" charset="0"/>
-                <a:cs typeface="Arial" panose="020B0604020202020204" pitchFamily="34" charset="0"/>
-              </a:rPr>
-              <a:t>a</a:t>
-            </a:r>
-            <a:r>
-              <a:rPr lang="es-ES" sz="800" baseline="30000" dirty="0">
-                <a:solidFill>
-                  <a:schemeClr val="tx1"/>
-                </a:solidFill>
-                <a:latin typeface="Arial" panose="020B0604020202020204" pitchFamily="34" charset="0"/>
-                <a:cs typeface="Arial" panose="020B0604020202020204" pitchFamily="34" charset="0"/>
-              </a:rPr>
-              <a:t>2</a:t>
-            </a:r>
-            <a:r>
-              <a:rPr lang="es-ES" sz="800" dirty="0">
-                <a:solidFill>
-                  <a:schemeClr val="tx1"/>
-                </a:solidFill>
-                <a:latin typeface="Arial" panose="020B0604020202020204" pitchFamily="34" charset="0"/>
-                <a:cs typeface="Arial" panose="020B0604020202020204" pitchFamily="34" charset="0"/>
-              </a:rPr>
-              <a:t> –</a:t>
-            </a:r>
-            <a:r>
-              <a:rPr lang="es-ES" sz="800" dirty="0" smtClean="0">
-                <a:solidFill>
-                  <a:schemeClr val="tx1"/>
-                </a:solidFill>
-                <a:latin typeface="Arial" panose="020B0604020202020204" pitchFamily="34" charset="0"/>
-                <a:cs typeface="Arial" panose="020B0604020202020204" pitchFamily="34" charset="0"/>
-              </a:rPr>
-              <a:t> </a:t>
-            </a:r>
-            <a:r>
-              <a:rPr lang="es-ES" sz="800" dirty="0">
-                <a:solidFill>
-                  <a:schemeClr val="tx1"/>
-                </a:solidFill>
-                <a:latin typeface="Arial" panose="020B0604020202020204" pitchFamily="34" charset="0"/>
-                <a:cs typeface="Arial" panose="020B0604020202020204" pitchFamily="34" charset="0"/>
-              </a:rPr>
-              <a:t>2</a:t>
-            </a:r>
-            <a:r>
-              <a:rPr lang="es-ES" sz="800" i="1" dirty="0">
-                <a:solidFill>
-                  <a:schemeClr val="tx1"/>
-                </a:solidFill>
-                <a:latin typeface="Arial" panose="020B0604020202020204" pitchFamily="34" charset="0"/>
-                <a:cs typeface="Arial" panose="020B0604020202020204" pitchFamily="34" charset="0"/>
-              </a:rPr>
-              <a:t>ab</a:t>
-            </a:r>
-            <a:r>
-              <a:rPr lang="es-ES" sz="800" dirty="0">
-                <a:solidFill>
-                  <a:schemeClr val="tx1"/>
-                </a:solidFill>
-                <a:latin typeface="Arial" panose="020B0604020202020204" pitchFamily="34" charset="0"/>
-                <a:cs typeface="Arial" panose="020B0604020202020204" pitchFamily="34" charset="0"/>
-              </a:rPr>
-              <a:t> + </a:t>
-            </a:r>
-            <a:r>
-              <a:rPr lang="es-ES" sz="800" i="1" dirty="0" smtClean="0">
-                <a:solidFill>
-                  <a:schemeClr val="tx1"/>
-                </a:solidFill>
-                <a:latin typeface="Arial" panose="020B0604020202020204" pitchFamily="34" charset="0"/>
-                <a:cs typeface="Arial" panose="020B0604020202020204" pitchFamily="34" charset="0"/>
-              </a:rPr>
-              <a:t>b</a:t>
-            </a:r>
-            <a:r>
-              <a:rPr lang="es-ES" sz="800" baseline="30000" dirty="0" smtClean="0">
-                <a:solidFill>
-                  <a:schemeClr val="tx1"/>
-                </a:solidFill>
-                <a:latin typeface="Arial" panose="020B0604020202020204" pitchFamily="34" charset="0"/>
-                <a:cs typeface="Arial" panose="020B0604020202020204" pitchFamily="34" charset="0"/>
-              </a:rPr>
-              <a:t>2</a:t>
-            </a:r>
             <a:endParaRPr lang="es-ES" sz="800" baseline="30000" dirty="0">
               <a:solidFill>
                 <a:schemeClr val="tx1"/>
@@ -4779,8 +3635,8 @@
         </p:nvSpPr>
         <p:spPr>
           <a:xfrm>
-            <a:off x="1167923" y="4942048"/>
-            <a:ext cx="1304286" cy="219307"/>
+            <a:off x="1210075" y="4950791"/>
+            <a:ext cx="1240982" cy="284116"/>
           </a:xfrm>
           <a:prstGeom prst="rect">
             <a:avLst/>
@@ -4811,166 +3667,6 @@
           <a:lstStyle/>
           <a:p>
             <a:pPr algn="ctr"/>
-            <a:r>
-              <a:rPr lang="es-ES" sz="800" dirty="0" smtClean="0">
-                <a:solidFill>
-                  <a:schemeClr val="tx1"/>
-                </a:solidFill>
-                <a:latin typeface="Arial" panose="020B0604020202020204" pitchFamily="34" charset="0"/>
-                <a:cs typeface="Arial" panose="020B0604020202020204" pitchFamily="34" charset="0"/>
-              </a:rPr>
-              <a:t>(</a:t>
-            </a:r>
-            <a:r>
-              <a:rPr lang="es-ES" sz="800" i="1" dirty="0" smtClean="0">
-                <a:solidFill>
-                  <a:schemeClr val="tx1"/>
-                </a:solidFill>
-                <a:latin typeface="Arial" panose="020B0604020202020204" pitchFamily="34" charset="0"/>
-                <a:cs typeface="Arial" panose="020B0604020202020204" pitchFamily="34" charset="0"/>
-              </a:rPr>
-              <a:t>a</a:t>
-            </a:r>
-            <a:r>
-              <a:rPr lang="es-ES" sz="800" dirty="0" smtClean="0">
-                <a:solidFill>
-                  <a:schemeClr val="tx1"/>
-                </a:solidFill>
-                <a:latin typeface="Arial" panose="020B0604020202020204" pitchFamily="34" charset="0"/>
-                <a:cs typeface="Arial" panose="020B0604020202020204" pitchFamily="34" charset="0"/>
-              </a:rPr>
-              <a:t> + </a:t>
-            </a:r>
-            <a:r>
-              <a:rPr lang="es-ES" sz="800" i="1" dirty="0" smtClean="0">
-                <a:solidFill>
-                  <a:schemeClr val="tx1"/>
-                </a:solidFill>
-                <a:latin typeface="Arial" panose="020B0604020202020204" pitchFamily="34" charset="0"/>
-                <a:cs typeface="Arial" panose="020B0604020202020204" pitchFamily="34" charset="0"/>
-              </a:rPr>
-              <a:t>b</a:t>
-            </a:r>
-            <a:r>
-              <a:rPr lang="es-ES" sz="800" dirty="0" smtClean="0">
-                <a:solidFill>
-                  <a:schemeClr val="tx1"/>
-                </a:solidFill>
-                <a:latin typeface="Arial" panose="020B0604020202020204" pitchFamily="34" charset="0"/>
-                <a:cs typeface="Arial" panose="020B0604020202020204" pitchFamily="34" charset="0"/>
-              </a:rPr>
-              <a:t>)</a:t>
-            </a:r>
-            <a:r>
-              <a:rPr lang="es-ES" sz="800" baseline="30000" dirty="0" smtClean="0">
-                <a:solidFill>
-                  <a:schemeClr val="tx1"/>
-                </a:solidFill>
-                <a:latin typeface="Arial" panose="020B0604020202020204" pitchFamily="34" charset="0"/>
-                <a:cs typeface="Arial" panose="020B0604020202020204" pitchFamily="34" charset="0"/>
-              </a:rPr>
-              <a:t> </a:t>
-            </a:r>
-            <a:r>
-              <a:rPr lang="es-ES" sz="800" dirty="0" smtClean="0">
-                <a:solidFill>
-                  <a:schemeClr val="tx1"/>
-                </a:solidFill>
-                <a:latin typeface="Arial" panose="020B0604020202020204" pitchFamily="34" charset="0"/>
-                <a:cs typeface="Arial" panose="020B0604020202020204" pitchFamily="34" charset="0"/>
-              </a:rPr>
-              <a:t>(</a:t>
-            </a:r>
-            <a:r>
-              <a:rPr lang="es-ES" sz="800" i="1" dirty="0" smtClean="0">
-                <a:solidFill>
-                  <a:schemeClr val="tx1"/>
-                </a:solidFill>
-                <a:latin typeface="Arial" panose="020B0604020202020204" pitchFamily="34" charset="0"/>
-                <a:cs typeface="Arial" panose="020B0604020202020204" pitchFamily="34" charset="0"/>
-              </a:rPr>
-              <a:t>a</a:t>
-            </a:r>
-            <a:r>
-              <a:rPr lang="es-ES" sz="800" dirty="0" smtClean="0">
-                <a:solidFill>
-                  <a:schemeClr val="tx1"/>
-                </a:solidFill>
-                <a:latin typeface="Arial" panose="020B0604020202020204" pitchFamily="34" charset="0"/>
-                <a:cs typeface="Arial" panose="020B0604020202020204" pitchFamily="34" charset="0"/>
-              </a:rPr>
-              <a:t> – </a:t>
-            </a:r>
-            <a:r>
-              <a:rPr lang="es-ES" sz="800" i="1" dirty="0" smtClean="0">
-                <a:solidFill>
-                  <a:schemeClr val="tx1"/>
-                </a:solidFill>
-                <a:latin typeface="Arial" panose="020B0604020202020204" pitchFamily="34" charset="0"/>
-                <a:cs typeface="Arial" panose="020B0604020202020204" pitchFamily="34" charset="0"/>
-              </a:rPr>
-              <a:t>b</a:t>
-            </a:r>
-            <a:r>
-              <a:rPr lang="es-ES" sz="800" dirty="0" smtClean="0">
-                <a:solidFill>
-                  <a:schemeClr val="tx1"/>
-                </a:solidFill>
-                <a:latin typeface="Arial" panose="020B0604020202020204" pitchFamily="34" charset="0"/>
-                <a:cs typeface="Arial" panose="020B0604020202020204" pitchFamily="34" charset="0"/>
-              </a:rPr>
-              <a:t>) = </a:t>
-            </a:r>
-            <a:r>
-              <a:rPr lang="es-ES" sz="800" i="1" dirty="0" smtClean="0">
-                <a:solidFill>
-                  <a:schemeClr val="tx1"/>
-                </a:solidFill>
-                <a:latin typeface="Arial" panose="020B0604020202020204" pitchFamily="34" charset="0"/>
-                <a:cs typeface="Arial" panose="020B0604020202020204" pitchFamily="34" charset="0"/>
-              </a:rPr>
-              <a:t>a</a:t>
-            </a:r>
-            <a:r>
-              <a:rPr lang="es-ES" sz="800" baseline="30000" dirty="0" smtClean="0">
-                <a:solidFill>
-                  <a:schemeClr val="tx1"/>
-                </a:solidFill>
-                <a:latin typeface="Arial" panose="020B0604020202020204" pitchFamily="34" charset="0"/>
-                <a:cs typeface="Arial" panose="020B0604020202020204" pitchFamily="34" charset="0"/>
-              </a:rPr>
-              <a:t>2</a:t>
-            </a:r>
-            <a:r>
-              <a:rPr lang="es-ES" sz="800" dirty="0" smtClean="0">
-                <a:solidFill>
-                  <a:schemeClr val="tx1"/>
-                </a:solidFill>
-                <a:latin typeface="Arial" panose="020B0604020202020204" pitchFamily="34" charset="0"/>
-                <a:cs typeface="Arial" panose="020B0604020202020204" pitchFamily="34" charset="0"/>
-              </a:rPr>
-              <a:t> – </a:t>
-            </a:r>
-            <a:r>
-              <a:rPr lang="es-ES" sz="800" i="1" dirty="0" smtClean="0">
-                <a:solidFill>
-                  <a:schemeClr val="tx1"/>
-                </a:solidFill>
-                <a:latin typeface="Arial" panose="020B0604020202020204" pitchFamily="34" charset="0"/>
-                <a:cs typeface="Arial" panose="020B0604020202020204" pitchFamily="34" charset="0"/>
-              </a:rPr>
-              <a:t>b</a:t>
-            </a:r>
-            <a:r>
-              <a:rPr lang="es-ES" sz="800" baseline="30000" dirty="0" smtClean="0">
-                <a:solidFill>
-                  <a:schemeClr val="tx1"/>
-                </a:solidFill>
-                <a:latin typeface="Arial" panose="020B0604020202020204" pitchFamily="34" charset="0"/>
-                <a:cs typeface="Arial" panose="020B0604020202020204" pitchFamily="34" charset="0"/>
-              </a:rPr>
-              <a:t>2</a:t>
-            </a:r>
             <a:endParaRPr lang="es-ES" sz="800" baseline="30000" dirty="0">
               <a:solidFill>
                 <a:schemeClr val="tx1"/>
@@ -5021,469 +3717,6 @@
           <a:lstStyle/>
           <a:p>
             <a:pPr algn="ctr"/>
-            <a:r>
-              <a:rPr lang="es-ES" sz="800" dirty="0">
-                <a:solidFill>
-                  <a:schemeClr val="tx1"/>
-                </a:solidFill>
-                <a:latin typeface="Arial" panose="020B0604020202020204" pitchFamily="34" charset="0"/>
-                <a:cs typeface="Arial" panose="020B0604020202020204" pitchFamily="34" charset="0"/>
-              </a:rPr>
-              <a:t>(</a:t>
-            </a:r>
-            <a:r>
-              <a:rPr lang="es-ES" sz="800" i="1" dirty="0">
-                <a:solidFill>
-                  <a:schemeClr val="tx1"/>
-                </a:solidFill>
-                <a:latin typeface="Arial" panose="020B0604020202020204" pitchFamily="34" charset="0"/>
-                <a:cs typeface="Arial" panose="020B0604020202020204" pitchFamily="34" charset="0"/>
-              </a:rPr>
-              <a:t>a</a:t>
-            </a:r>
-            <a:r>
-              <a:rPr lang="es-ES" sz="800" dirty="0">
-                <a:solidFill>
-                  <a:schemeClr val="tx1"/>
-                </a:solidFill>
-                <a:latin typeface="Arial" panose="020B0604020202020204" pitchFamily="34" charset="0"/>
-                <a:cs typeface="Arial" panose="020B0604020202020204" pitchFamily="34" charset="0"/>
-              </a:rPr>
-              <a:t> + </a:t>
-            </a:r>
-            <a:r>
-              <a:rPr lang="es-ES" sz="800" i="1" dirty="0" smtClean="0">
-                <a:solidFill>
-                  <a:schemeClr val="tx1"/>
-                </a:solidFill>
-                <a:latin typeface="Arial" panose="020B0604020202020204" pitchFamily="34" charset="0"/>
-                <a:cs typeface="Arial" panose="020B0604020202020204" pitchFamily="34" charset="0"/>
-              </a:rPr>
-              <a:t>b</a:t>
-            </a:r>
-            <a:r>
-              <a:rPr lang="es-ES" sz="800" dirty="0" smtClean="0">
-                <a:solidFill>
-                  <a:schemeClr val="tx1"/>
-                </a:solidFill>
-                <a:latin typeface="Arial" panose="020B0604020202020204" pitchFamily="34" charset="0"/>
-                <a:cs typeface="Arial" panose="020B0604020202020204" pitchFamily="34" charset="0"/>
-              </a:rPr>
-              <a:t>)</a:t>
-            </a:r>
-            <a:r>
-              <a:rPr lang="es-ES" sz="800" baseline="30000" dirty="0" smtClean="0">
-                <a:solidFill>
-                  <a:schemeClr val="tx1"/>
-                </a:solidFill>
-                <a:latin typeface="Arial" panose="020B0604020202020204" pitchFamily="34" charset="0"/>
-                <a:cs typeface="Arial" panose="020B0604020202020204" pitchFamily="34" charset="0"/>
-              </a:rPr>
-              <a:t>3</a:t>
-            </a:r>
-            <a:r>
-              <a:rPr lang="es-ES" sz="800" dirty="0" smtClean="0">
-                <a:solidFill>
-                  <a:schemeClr val="tx1"/>
-                </a:solidFill>
-                <a:latin typeface="Arial" panose="020B0604020202020204" pitchFamily="34" charset="0"/>
-                <a:cs typeface="Arial" panose="020B0604020202020204" pitchFamily="34" charset="0"/>
-              </a:rPr>
-              <a:t> </a:t>
-            </a:r>
-            <a:r>
-              <a:rPr lang="es-ES" sz="800" dirty="0">
-                <a:solidFill>
-                  <a:schemeClr val="tx1"/>
-                </a:solidFill>
-                <a:latin typeface="Arial" panose="020B0604020202020204" pitchFamily="34" charset="0"/>
-                <a:cs typeface="Arial" panose="020B0604020202020204" pitchFamily="34" charset="0"/>
-              </a:rPr>
-              <a:t>= </a:t>
-            </a:r>
-            <a:r>
-              <a:rPr lang="es-ES" sz="800" i="1" dirty="0">
-                <a:solidFill>
-                  <a:schemeClr val="tx1"/>
-                </a:solidFill>
-                <a:latin typeface="Arial" panose="020B0604020202020204" pitchFamily="34" charset="0"/>
-                <a:cs typeface="Arial" panose="020B0604020202020204" pitchFamily="34" charset="0"/>
-              </a:rPr>
-              <a:t>a</a:t>
-            </a:r>
-            <a:r>
-              <a:rPr lang="es-ES" sz="800" baseline="30000" dirty="0">
-                <a:solidFill>
-                  <a:schemeClr val="tx1"/>
-                </a:solidFill>
-                <a:latin typeface="Arial" panose="020B0604020202020204" pitchFamily="34" charset="0"/>
-                <a:cs typeface="Arial" panose="020B0604020202020204" pitchFamily="34" charset="0"/>
-              </a:rPr>
-              <a:t>2</a:t>
-            </a:r>
-            <a:r>
-              <a:rPr lang="es-ES" sz="800" dirty="0">
-                <a:solidFill>
-                  <a:schemeClr val="tx1"/>
-                </a:solidFill>
-                <a:latin typeface="Arial" panose="020B0604020202020204" pitchFamily="34" charset="0"/>
-                <a:cs typeface="Arial" panose="020B0604020202020204" pitchFamily="34" charset="0"/>
-              </a:rPr>
-              <a:t> + </a:t>
-            </a:r>
-            <a:r>
-              <a:rPr lang="es-ES" sz="800" dirty="0" smtClean="0">
-                <a:solidFill>
-                  <a:schemeClr val="tx1"/>
-                </a:solidFill>
-                <a:latin typeface="Arial" panose="020B0604020202020204" pitchFamily="34" charset="0"/>
-                <a:cs typeface="Arial" panose="020B0604020202020204" pitchFamily="34" charset="0"/>
-              </a:rPr>
-              <a:t>3</a:t>
-            </a:r>
-            <a:r>
-              <a:rPr lang="es-ES" sz="800" i="1" dirty="0" smtClean="0">
-                <a:solidFill>
-                  <a:schemeClr val="tx1"/>
-                </a:solidFill>
-                <a:latin typeface="Arial" panose="020B0604020202020204" pitchFamily="34" charset="0"/>
-                <a:cs typeface="Arial" panose="020B0604020202020204" pitchFamily="34" charset="0"/>
-              </a:rPr>
-              <a:t>a</a:t>
-            </a:r>
-            <a:r>
-              <a:rPr lang="es-ES" sz="800" i="1" baseline="30000" dirty="0" smtClean="0">
-                <a:solidFill>
-                  <a:schemeClr val="tx1"/>
-                </a:solidFill>
-                <a:latin typeface="Arial" panose="020B0604020202020204" pitchFamily="34" charset="0"/>
-                <a:cs typeface="Arial" panose="020B0604020202020204" pitchFamily="34" charset="0"/>
-              </a:rPr>
-              <a:t>2</a:t>
-            </a:r>
-            <a:r>
-              <a:rPr lang="es-ES" sz="800" i="1" dirty="0" smtClean="0">
-                <a:solidFill>
-                  <a:schemeClr val="tx1"/>
-                </a:solidFill>
-                <a:latin typeface="Arial" panose="020B0604020202020204" pitchFamily="34" charset="0"/>
-                <a:cs typeface="Arial" panose="020B0604020202020204" pitchFamily="34" charset="0"/>
-              </a:rPr>
-              <a:t>b</a:t>
-            </a:r>
-            <a:r>
-              <a:rPr lang="es-ES" sz="800" dirty="0" smtClean="0">
-                <a:solidFill>
-                  <a:schemeClr val="tx1"/>
-                </a:solidFill>
-                <a:latin typeface="Arial" panose="020B0604020202020204" pitchFamily="34" charset="0"/>
-                <a:cs typeface="Arial" panose="020B0604020202020204" pitchFamily="34" charset="0"/>
-              </a:rPr>
-              <a:t> </a:t>
-            </a:r>
-            <a:r>
-              <a:rPr lang="es-ES" sz="800" dirty="0">
-                <a:solidFill>
-                  <a:schemeClr val="tx1"/>
-                </a:solidFill>
-                <a:latin typeface="Arial" panose="020B0604020202020204" pitchFamily="34" charset="0"/>
-                <a:cs typeface="Arial" panose="020B0604020202020204" pitchFamily="34" charset="0"/>
-              </a:rPr>
-              <a:t>+ </a:t>
-            </a:r>
-            <a:r>
-              <a:rPr lang="es-ES" sz="800" dirty="0" smtClean="0">
-                <a:solidFill>
-                  <a:schemeClr val="tx1"/>
-                </a:solidFill>
-                <a:latin typeface="Arial" panose="020B0604020202020204" pitchFamily="34" charset="0"/>
-                <a:cs typeface="Arial" panose="020B0604020202020204" pitchFamily="34" charset="0"/>
-              </a:rPr>
-              <a:t>3</a:t>
-            </a:r>
-            <a:r>
-              <a:rPr lang="es-ES" sz="800" i="1" dirty="0" smtClean="0">
-                <a:solidFill>
-                  <a:schemeClr val="tx1"/>
-                </a:solidFill>
-                <a:latin typeface="Arial" panose="020B0604020202020204" pitchFamily="34" charset="0"/>
-                <a:cs typeface="Arial" panose="020B0604020202020204" pitchFamily="34" charset="0"/>
-              </a:rPr>
-              <a:t>ab</a:t>
-            </a:r>
-            <a:r>
-              <a:rPr lang="es-ES" sz="800" baseline="30000" dirty="0" smtClean="0">
-                <a:solidFill>
-                  <a:schemeClr val="tx1"/>
-                </a:solidFill>
-                <a:latin typeface="Arial" panose="020B0604020202020204" pitchFamily="34" charset="0"/>
-                <a:cs typeface="Arial" panose="020B0604020202020204" pitchFamily="34" charset="0"/>
-              </a:rPr>
-              <a:t>2</a:t>
-            </a:r>
-            <a:r>
-              <a:rPr lang="es-ES" sz="800" dirty="0" smtClean="0">
-                <a:solidFill>
-                  <a:schemeClr val="tx1"/>
-                </a:solidFill>
-                <a:latin typeface="Arial" panose="020B0604020202020204" pitchFamily="34" charset="0"/>
-                <a:cs typeface="Arial" panose="020B0604020202020204" pitchFamily="34" charset="0"/>
-              </a:rPr>
-              <a:t> + </a:t>
-            </a:r>
-            <a:r>
-              <a:rPr lang="es-ES" sz="800" i="1" dirty="0" smtClean="0">
-                <a:solidFill>
-                  <a:schemeClr val="tx1"/>
-                </a:solidFill>
-                <a:latin typeface="Arial" panose="020B0604020202020204" pitchFamily="34" charset="0"/>
-                <a:cs typeface="Arial" panose="020B0604020202020204" pitchFamily="34" charset="0"/>
-              </a:rPr>
-              <a:t>b</a:t>
-            </a:r>
-            <a:r>
-              <a:rPr lang="es-ES" sz="800" baseline="30000" dirty="0" smtClean="0">
-                <a:solidFill>
-                  <a:schemeClr val="tx1"/>
-                </a:solidFill>
-                <a:latin typeface="Arial" panose="020B0604020202020204" pitchFamily="34" charset="0"/>
-                <a:cs typeface="Arial" panose="020B0604020202020204" pitchFamily="34" charset="0"/>
-              </a:rPr>
-              <a:t>3</a:t>
-            </a:r>
-          </a:p>
-          <a:p>
-            <a:pPr algn="ctr"/>
-            <a:r>
-              <a:rPr lang="es-ES" sz="800" dirty="0">
-                <a:solidFill>
-                  <a:schemeClr val="tx1"/>
-                </a:solidFill>
-                <a:latin typeface="Arial" panose="020B0604020202020204" pitchFamily="34" charset="0"/>
-                <a:cs typeface="Arial" panose="020B0604020202020204" pitchFamily="34" charset="0"/>
-              </a:rPr>
-              <a:t>(</a:t>
-            </a:r>
-            <a:r>
-              <a:rPr lang="es-ES" sz="800" i="1" dirty="0">
-                <a:solidFill>
-                  <a:schemeClr val="tx1"/>
-                </a:solidFill>
-                <a:latin typeface="Arial" panose="020B0604020202020204" pitchFamily="34" charset="0"/>
-                <a:cs typeface="Arial" panose="020B0604020202020204" pitchFamily="34" charset="0"/>
-              </a:rPr>
-              <a:t>a</a:t>
-            </a:r>
-            <a:r>
-              <a:rPr lang="es-ES" sz="800" dirty="0">
-                <a:solidFill>
-                  <a:schemeClr val="tx1"/>
-                </a:solidFill>
-                <a:latin typeface="Arial" panose="020B0604020202020204" pitchFamily="34" charset="0"/>
-                <a:cs typeface="Arial" panose="020B0604020202020204" pitchFamily="34" charset="0"/>
-              </a:rPr>
-              <a:t> –</a:t>
-            </a:r>
-            <a:r>
-              <a:rPr lang="es-ES" sz="800" dirty="0" smtClean="0">
-                <a:solidFill>
-                  <a:schemeClr val="tx1"/>
-                </a:solidFill>
-                <a:latin typeface="Arial" panose="020B0604020202020204" pitchFamily="34" charset="0"/>
-                <a:cs typeface="Arial" panose="020B0604020202020204" pitchFamily="34" charset="0"/>
-              </a:rPr>
-              <a:t> </a:t>
-            </a:r>
-            <a:r>
-              <a:rPr lang="es-ES" sz="800" i="1" dirty="0">
-                <a:solidFill>
-                  <a:schemeClr val="tx1"/>
-                </a:solidFill>
-                <a:latin typeface="Arial" panose="020B0604020202020204" pitchFamily="34" charset="0"/>
-                <a:cs typeface="Arial" panose="020B0604020202020204" pitchFamily="34" charset="0"/>
-              </a:rPr>
-              <a:t>b</a:t>
-            </a:r>
-            <a:r>
-              <a:rPr lang="es-ES" sz="800" dirty="0">
-                <a:solidFill>
-                  <a:schemeClr val="tx1"/>
-                </a:solidFill>
-                <a:latin typeface="Arial" panose="020B0604020202020204" pitchFamily="34" charset="0"/>
-                <a:cs typeface="Arial" panose="020B0604020202020204" pitchFamily="34" charset="0"/>
-              </a:rPr>
-              <a:t>)</a:t>
-            </a:r>
-            <a:r>
-              <a:rPr lang="es-ES" sz="800" baseline="30000" dirty="0">
-                <a:solidFill>
-                  <a:schemeClr val="tx1"/>
-                </a:solidFill>
-                <a:latin typeface="Arial" panose="020B0604020202020204" pitchFamily="34" charset="0"/>
-                <a:cs typeface="Arial" panose="020B0604020202020204" pitchFamily="34" charset="0"/>
-              </a:rPr>
-              <a:t>3</a:t>
-            </a:r>
-            <a:r>
-              <a:rPr lang="es-ES" sz="800" dirty="0">
-                <a:solidFill>
-                  <a:schemeClr val="tx1"/>
-                </a:solidFill>
-                <a:latin typeface="Arial" panose="020B0604020202020204" pitchFamily="34" charset="0"/>
-                <a:cs typeface="Arial" panose="020B0604020202020204" pitchFamily="34" charset="0"/>
-              </a:rPr>
-              <a:t> = </a:t>
-            </a:r>
-            <a:r>
-              <a:rPr lang="es-ES" sz="800" i="1" dirty="0">
-                <a:solidFill>
-                  <a:schemeClr val="tx1"/>
-                </a:solidFill>
-                <a:latin typeface="Arial" panose="020B0604020202020204" pitchFamily="34" charset="0"/>
-                <a:cs typeface="Arial" panose="020B0604020202020204" pitchFamily="34" charset="0"/>
-              </a:rPr>
-              <a:t>a</a:t>
-            </a:r>
-            <a:r>
-              <a:rPr lang="es-ES" sz="800" baseline="30000" dirty="0">
-                <a:solidFill>
-                  <a:schemeClr val="tx1"/>
-                </a:solidFill>
-                <a:latin typeface="Arial" panose="020B0604020202020204" pitchFamily="34" charset="0"/>
-                <a:cs typeface="Arial" panose="020B0604020202020204" pitchFamily="34" charset="0"/>
-              </a:rPr>
-              <a:t>2</a:t>
-            </a:r>
-            <a:r>
-              <a:rPr lang="es-ES" sz="800" dirty="0">
-                <a:solidFill>
-                  <a:schemeClr val="tx1"/>
-                </a:solidFill>
-                <a:latin typeface="Arial" panose="020B0604020202020204" pitchFamily="34" charset="0"/>
-                <a:cs typeface="Arial" panose="020B0604020202020204" pitchFamily="34" charset="0"/>
-              </a:rPr>
-              <a:t> –</a:t>
-            </a:r>
-            <a:r>
-              <a:rPr lang="es-ES" sz="800" dirty="0" smtClean="0">
-                <a:solidFill>
-                  <a:schemeClr val="tx1"/>
-                </a:solidFill>
-                <a:latin typeface="Arial" panose="020B0604020202020204" pitchFamily="34" charset="0"/>
-                <a:cs typeface="Arial" panose="020B0604020202020204" pitchFamily="34" charset="0"/>
-              </a:rPr>
-              <a:t> </a:t>
-            </a:r>
-            <a:r>
-              <a:rPr lang="es-ES" sz="800" dirty="0">
-                <a:solidFill>
-                  <a:schemeClr val="tx1"/>
-                </a:solidFill>
-                <a:latin typeface="Arial" panose="020B0604020202020204" pitchFamily="34" charset="0"/>
-                <a:cs typeface="Arial" panose="020B0604020202020204" pitchFamily="34" charset="0"/>
-              </a:rPr>
-              <a:t>3</a:t>
-            </a:r>
-            <a:r>
-              <a:rPr lang="es-ES" sz="800" i="1" dirty="0">
-                <a:solidFill>
-                  <a:schemeClr val="tx1"/>
-                </a:solidFill>
-                <a:latin typeface="Arial" panose="020B0604020202020204" pitchFamily="34" charset="0"/>
-                <a:cs typeface="Arial" panose="020B0604020202020204" pitchFamily="34" charset="0"/>
-              </a:rPr>
-              <a:t>a</a:t>
-            </a:r>
-            <a:r>
-              <a:rPr lang="es-ES" sz="800" i="1" baseline="30000" dirty="0">
-                <a:solidFill>
-                  <a:schemeClr val="tx1"/>
-                </a:solidFill>
-                <a:latin typeface="Arial" panose="020B0604020202020204" pitchFamily="34" charset="0"/>
-                <a:cs typeface="Arial" panose="020B0604020202020204" pitchFamily="34" charset="0"/>
-              </a:rPr>
-              <a:t>2</a:t>
-            </a:r>
-            <a:r>
-              <a:rPr lang="es-ES" sz="800" i="1" dirty="0">
-                <a:solidFill>
-                  <a:schemeClr val="tx1"/>
-                </a:solidFill>
-                <a:latin typeface="Arial" panose="020B0604020202020204" pitchFamily="34" charset="0"/>
-                <a:cs typeface="Arial" panose="020B0604020202020204" pitchFamily="34" charset="0"/>
-              </a:rPr>
-              <a:t>b</a:t>
-            </a:r>
-            <a:r>
-              <a:rPr lang="es-ES" sz="800" dirty="0">
-                <a:solidFill>
-                  <a:schemeClr val="tx1"/>
-                </a:solidFill>
-                <a:latin typeface="Arial" panose="020B0604020202020204" pitchFamily="34" charset="0"/>
-                <a:cs typeface="Arial" panose="020B0604020202020204" pitchFamily="34" charset="0"/>
-              </a:rPr>
-              <a:t> + 3</a:t>
-            </a:r>
-            <a:r>
-              <a:rPr lang="es-ES" sz="800" i="1" dirty="0">
-                <a:solidFill>
-                  <a:schemeClr val="tx1"/>
-                </a:solidFill>
-                <a:latin typeface="Arial" panose="020B0604020202020204" pitchFamily="34" charset="0"/>
-                <a:cs typeface="Arial" panose="020B0604020202020204" pitchFamily="34" charset="0"/>
-              </a:rPr>
-              <a:t>ab</a:t>
-            </a:r>
-            <a:r>
-              <a:rPr lang="es-ES" sz="800" baseline="30000" dirty="0">
-                <a:solidFill>
-                  <a:schemeClr val="tx1"/>
-                </a:solidFill>
-                <a:latin typeface="Arial" panose="020B0604020202020204" pitchFamily="34" charset="0"/>
-                <a:cs typeface="Arial" panose="020B0604020202020204" pitchFamily="34" charset="0"/>
-              </a:rPr>
-              <a:t>2</a:t>
-            </a:r>
-            <a:r>
-              <a:rPr lang="es-ES" sz="800" dirty="0">
-                <a:solidFill>
-                  <a:schemeClr val="tx1"/>
-                </a:solidFill>
-                <a:latin typeface="Arial" panose="020B0604020202020204" pitchFamily="34" charset="0"/>
-                <a:cs typeface="Arial" panose="020B0604020202020204" pitchFamily="34" charset="0"/>
-              </a:rPr>
-              <a:t> –</a:t>
-            </a:r>
-            <a:r>
-              <a:rPr lang="es-ES" sz="800" dirty="0" smtClean="0">
-                <a:solidFill>
-                  <a:schemeClr val="tx1"/>
-                </a:solidFill>
-                <a:latin typeface="Arial" panose="020B0604020202020204" pitchFamily="34" charset="0"/>
-                <a:cs typeface="Arial" panose="020B0604020202020204" pitchFamily="34" charset="0"/>
-              </a:rPr>
-              <a:t> </a:t>
-            </a:r>
-            <a:r>
-              <a:rPr lang="es-ES" sz="800" i="1" dirty="0" smtClean="0">
-                <a:solidFill>
-                  <a:schemeClr val="tx1"/>
-                </a:solidFill>
-                <a:latin typeface="Arial" panose="020B0604020202020204" pitchFamily="34" charset="0"/>
-                <a:cs typeface="Arial" panose="020B0604020202020204" pitchFamily="34" charset="0"/>
-              </a:rPr>
-              <a:t>b</a:t>
-            </a:r>
-            <a:r>
-              <a:rPr lang="es-ES" sz="800" baseline="30000" dirty="0" smtClean="0">
-                <a:solidFill>
-                  <a:schemeClr val="tx1"/>
-                </a:solidFill>
-                <a:latin typeface="Arial" panose="020B0604020202020204" pitchFamily="34" charset="0"/>
-                <a:cs typeface="Arial" panose="020B0604020202020204" pitchFamily="34" charset="0"/>
-              </a:rPr>
-              <a:t>3</a:t>
-            </a:r>
             <a:endParaRPr lang="es-ES" sz="800" baseline="30000" dirty="0">
               <a:solidFill>
                 <a:schemeClr val="tx1"/>
@@ -5687,116 +3920,6 @@
           <a:lstStyle/>
           <a:p>
             <a:pPr algn="ctr"/>
-            <a:r>
-              <a:rPr lang="es-ES" sz="800" dirty="0" smtClean="0">
-                <a:solidFill>
-                  <a:schemeClr val="tx1"/>
-                </a:solidFill>
-                <a:latin typeface="Arial" panose="020B0604020202020204" pitchFamily="34" charset="0"/>
-                <a:cs typeface="Arial" panose="020B0604020202020204" pitchFamily="34" charset="0"/>
-              </a:rPr>
-              <a:t>(</a:t>
-            </a:r>
-            <a:r>
-              <a:rPr lang="es-ES" sz="800" i="1" dirty="0" smtClean="0">
-                <a:solidFill>
-                  <a:schemeClr val="tx1"/>
-                </a:solidFill>
-                <a:latin typeface="Arial" panose="020B0604020202020204" pitchFamily="34" charset="0"/>
-                <a:cs typeface="Arial" panose="020B0604020202020204" pitchFamily="34" charset="0"/>
-              </a:rPr>
-              <a:t>x + 3</a:t>
-            </a:r>
-            <a:r>
-              <a:rPr lang="es-ES" sz="800" dirty="0" smtClean="0">
-                <a:solidFill>
-                  <a:schemeClr val="tx1"/>
-                </a:solidFill>
-                <a:latin typeface="Arial" panose="020B0604020202020204" pitchFamily="34" charset="0"/>
-                <a:cs typeface="Arial" panose="020B0604020202020204" pitchFamily="34" charset="0"/>
-              </a:rPr>
-              <a:t>)(</a:t>
-            </a:r>
-            <a:r>
-              <a:rPr lang="es-ES" sz="800" i="1" dirty="0" smtClean="0">
-                <a:solidFill>
-                  <a:schemeClr val="tx1"/>
-                </a:solidFill>
-                <a:latin typeface="Arial" panose="020B0604020202020204" pitchFamily="34" charset="0"/>
-                <a:cs typeface="Arial" panose="020B0604020202020204" pitchFamily="34" charset="0"/>
-              </a:rPr>
-              <a:t>x + 2</a:t>
-            </a:r>
-            <a:r>
-              <a:rPr lang="es-ES" sz="800" dirty="0" smtClean="0">
-                <a:solidFill>
-                  <a:schemeClr val="tx1"/>
-                </a:solidFill>
-                <a:latin typeface="Arial" panose="020B0604020202020204" pitchFamily="34" charset="0"/>
-                <a:cs typeface="Arial" panose="020B0604020202020204" pitchFamily="34" charset="0"/>
-              </a:rPr>
-              <a:t>)</a:t>
-            </a:r>
-            <a:r>
-              <a:rPr lang="es-ES" sz="800" i="1" dirty="0" smtClean="0">
-                <a:solidFill>
-                  <a:schemeClr val="tx1"/>
-                </a:solidFill>
-                <a:latin typeface="Arial" panose="020B0604020202020204" pitchFamily="34" charset="0"/>
-                <a:cs typeface="Arial" panose="020B0604020202020204" pitchFamily="34" charset="0"/>
-              </a:rPr>
-              <a:t> = x</a:t>
-            </a:r>
-            <a:r>
-              <a:rPr lang="es-ES" sz="800" baseline="30000" dirty="0" smtClean="0">
-                <a:solidFill>
-                  <a:schemeClr val="tx1"/>
-                </a:solidFill>
-                <a:latin typeface="Arial" panose="020B0604020202020204" pitchFamily="34" charset="0"/>
-                <a:cs typeface="Arial" panose="020B0604020202020204" pitchFamily="34" charset="0"/>
-              </a:rPr>
-              <a:t>2</a:t>
-            </a:r>
-            <a:r>
-              <a:rPr lang="es-ES" sz="800" i="1" dirty="0" smtClean="0">
-                <a:solidFill>
-                  <a:schemeClr val="tx1"/>
-                </a:solidFill>
-                <a:latin typeface="Arial" panose="020B0604020202020204" pitchFamily="34" charset="0"/>
-                <a:cs typeface="Arial" panose="020B0604020202020204" pitchFamily="34" charset="0"/>
-              </a:rPr>
-              <a:t> + </a:t>
-            </a:r>
-            <a:r>
-              <a:rPr lang="es-ES" sz="800" dirty="0" smtClean="0">
-                <a:solidFill>
-                  <a:schemeClr val="tx1"/>
-                </a:solidFill>
-                <a:latin typeface="Arial" panose="020B0604020202020204" pitchFamily="34" charset="0"/>
-                <a:cs typeface="Arial" panose="020B0604020202020204" pitchFamily="34" charset="0"/>
-              </a:rPr>
-              <a:t>5</a:t>
-            </a:r>
-            <a:r>
-              <a:rPr lang="es-ES" sz="800" i="1" dirty="0" smtClean="0">
-                <a:solidFill>
-                  <a:schemeClr val="tx1"/>
-                </a:solidFill>
-                <a:latin typeface="Arial" panose="020B0604020202020204" pitchFamily="34" charset="0"/>
-                <a:cs typeface="Arial" panose="020B0604020202020204" pitchFamily="34" charset="0"/>
-              </a:rPr>
-              <a:t>x + </a:t>
-            </a:r>
-            <a:r>
-              <a:rPr lang="es-ES" sz="800" dirty="0" smtClean="0">
-                <a:solidFill>
-                  <a:schemeClr val="tx1"/>
-                </a:solidFill>
-                <a:latin typeface="Arial" panose="020B0604020202020204" pitchFamily="34" charset="0"/>
-                <a:cs typeface="Arial" panose="020B0604020202020204" pitchFamily="34" charset="0"/>
-              </a:rPr>
-              <a:t>6</a:t>
-            </a:r>
             <a:endParaRPr lang="es-ES" sz="800" dirty="0">
               <a:solidFill>
                 <a:schemeClr val="tx1"/>
@@ -5815,8 +3938,8 @@
         </p:nvSpPr>
         <p:spPr>
           <a:xfrm>
-            <a:off x="3642145" y="6167991"/>
-            <a:ext cx="2151392" cy="281205"/>
+            <a:off x="3532094" y="6167991"/>
+            <a:ext cx="2342777" cy="242329"/>
           </a:xfrm>
           <a:prstGeom prst="rect">
             <a:avLst/>
@@ -5847,166 +3970,6 @@
           <a:lstStyle/>
           <a:p>
             <a:pPr algn="ctr"/>
-            <a:r>
-              <a:rPr lang="es-ES" sz="800" dirty="0" smtClean="0">
-                <a:solidFill>
-                  <a:schemeClr val="tx1"/>
-                </a:solidFill>
-                <a:latin typeface="Arial" panose="020B0604020202020204" pitchFamily="34" charset="0"/>
-                <a:cs typeface="Arial" panose="020B0604020202020204" pitchFamily="34" charset="0"/>
-              </a:rPr>
-              <a:t>(</a:t>
-            </a:r>
-            <a:r>
-              <a:rPr lang="es-ES" sz="800" i="1" dirty="0" smtClean="0">
-                <a:solidFill>
-                  <a:schemeClr val="tx1"/>
-                </a:solidFill>
-                <a:latin typeface="Arial" panose="020B0604020202020204" pitchFamily="34" charset="0"/>
-                <a:cs typeface="Arial" panose="020B0604020202020204" pitchFamily="34" charset="0"/>
-              </a:rPr>
-              <a:t>a + b + c</a:t>
-            </a:r>
-            <a:r>
-              <a:rPr lang="es-ES" sz="800" dirty="0" smtClean="0">
-                <a:solidFill>
-                  <a:schemeClr val="tx1"/>
-                </a:solidFill>
-                <a:latin typeface="Arial" panose="020B0604020202020204" pitchFamily="34" charset="0"/>
-                <a:cs typeface="Arial" panose="020B0604020202020204" pitchFamily="34" charset="0"/>
-              </a:rPr>
-              <a:t>)</a:t>
-            </a:r>
-            <a:r>
-              <a:rPr lang="es-ES" sz="800" i="1" dirty="0" smtClean="0">
-                <a:solidFill>
-                  <a:schemeClr val="tx1"/>
-                </a:solidFill>
-                <a:latin typeface="Arial" panose="020B0604020202020204" pitchFamily="34" charset="0"/>
-                <a:cs typeface="Arial" panose="020B0604020202020204" pitchFamily="34" charset="0"/>
-              </a:rPr>
-              <a:t> = a</a:t>
-            </a:r>
-            <a:r>
-              <a:rPr lang="es-ES" sz="800" i="1" baseline="30000" dirty="0" smtClean="0">
-                <a:solidFill>
-                  <a:schemeClr val="tx1"/>
-                </a:solidFill>
-                <a:latin typeface="Arial" panose="020B0604020202020204" pitchFamily="34" charset="0"/>
-                <a:cs typeface="Arial" panose="020B0604020202020204" pitchFamily="34" charset="0"/>
-              </a:rPr>
-              <a:t>2</a:t>
-            </a:r>
-            <a:r>
-              <a:rPr lang="es-ES" sz="800" i="1" dirty="0" smtClean="0">
-                <a:solidFill>
-                  <a:schemeClr val="tx1"/>
-                </a:solidFill>
-                <a:latin typeface="Arial" panose="020B0604020202020204" pitchFamily="34" charset="0"/>
-                <a:cs typeface="Arial" panose="020B0604020202020204" pitchFamily="34" charset="0"/>
-              </a:rPr>
-              <a:t> + b</a:t>
-            </a:r>
-            <a:r>
-              <a:rPr lang="es-ES" sz="800" baseline="30000" dirty="0" smtClean="0">
-                <a:solidFill>
-                  <a:schemeClr val="tx1"/>
-                </a:solidFill>
-                <a:latin typeface="Arial" panose="020B0604020202020204" pitchFamily="34" charset="0"/>
-                <a:cs typeface="Arial" panose="020B0604020202020204" pitchFamily="34" charset="0"/>
-              </a:rPr>
-              <a:t>2</a:t>
-            </a:r>
-            <a:r>
-              <a:rPr lang="es-ES" sz="800" i="1" dirty="0" smtClean="0">
-                <a:solidFill>
-                  <a:schemeClr val="tx1"/>
-                </a:solidFill>
-                <a:latin typeface="Arial" panose="020B0604020202020204" pitchFamily="34" charset="0"/>
-                <a:cs typeface="Arial" panose="020B0604020202020204" pitchFamily="34" charset="0"/>
-              </a:rPr>
-              <a:t> + c</a:t>
-            </a:r>
-            <a:r>
-              <a:rPr lang="es-ES" sz="800" baseline="30000" dirty="0" smtClean="0">
-                <a:solidFill>
-                  <a:schemeClr val="tx1"/>
-                </a:solidFill>
-                <a:latin typeface="Arial" panose="020B0604020202020204" pitchFamily="34" charset="0"/>
-                <a:cs typeface="Arial" panose="020B0604020202020204" pitchFamily="34" charset="0"/>
-              </a:rPr>
-              <a:t>2</a:t>
-            </a:r>
-            <a:r>
-              <a:rPr lang="es-ES" sz="800" i="1" dirty="0" smtClean="0">
-                <a:solidFill>
-                  <a:schemeClr val="tx1"/>
-                </a:solidFill>
-                <a:latin typeface="Arial" panose="020B0604020202020204" pitchFamily="34" charset="0"/>
-                <a:cs typeface="Arial" panose="020B0604020202020204" pitchFamily="34" charset="0"/>
-              </a:rPr>
-              <a:t> + </a:t>
-            </a:r>
-            <a:r>
-              <a:rPr lang="es-ES" sz="800" dirty="0" smtClean="0">
-                <a:solidFill>
-                  <a:schemeClr val="tx1"/>
-                </a:solidFill>
-                <a:latin typeface="Arial" panose="020B0604020202020204" pitchFamily="34" charset="0"/>
-                <a:cs typeface="Arial" panose="020B0604020202020204" pitchFamily="34" charset="0"/>
-              </a:rPr>
-              <a:t>2</a:t>
-            </a:r>
-            <a:r>
-              <a:rPr lang="es-ES" sz="800" i="1" dirty="0" smtClean="0">
-                <a:solidFill>
-                  <a:schemeClr val="tx1"/>
-                </a:solidFill>
-                <a:latin typeface="Arial" panose="020B0604020202020204" pitchFamily="34" charset="0"/>
-                <a:cs typeface="Arial" panose="020B0604020202020204" pitchFamily="34" charset="0"/>
-              </a:rPr>
-              <a:t>ab + </a:t>
-            </a:r>
-            <a:r>
-              <a:rPr lang="es-ES" sz="800" dirty="0" smtClean="0">
-                <a:solidFill>
-                  <a:schemeClr val="tx1"/>
-                </a:solidFill>
-                <a:latin typeface="Arial" panose="020B0604020202020204" pitchFamily="34" charset="0"/>
-                <a:cs typeface="Arial" panose="020B0604020202020204" pitchFamily="34" charset="0"/>
-              </a:rPr>
-              <a:t>2</a:t>
-            </a:r>
-            <a:r>
-              <a:rPr lang="es-ES" sz="800" i="1" dirty="0" smtClean="0">
-                <a:solidFill>
-                  <a:schemeClr val="tx1"/>
-                </a:solidFill>
-                <a:latin typeface="Arial" panose="020B0604020202020204" pitchFamily="34" charset="0"/>
-                <a:cs typeface="Arial" panose="020B0604020202020204" pitchFamily="34" charset="0"/>
-              </a:rPr>
-              <a:t>bc + </a:t>
-            </a:r>
-            <a:r>
-              <a:rPr lang="es-ES" sz="800" dirty="0" smtClean="0">
-                <a:solidFill>
-                  <a:schemeClr val="tx1"/>
-                </a:solidFill>
-                <a:latin typeface="Arial" panose="020B0604020202020204" pitchFamily="34" charset="0"/>
-                <a:cs typeface="Arial" panose="020B0604020202020204" pitchFamily="34" charset="0"/>
-              </a:rPr>
-              <a:t>2</a:t>
-            </a:r>
-            <a:r>
-              <a:rPr lang="es-ES" sz="800" i="1" dirty="0" smtClean="0">
-                <a:solidFill>
-                  <a:schemeClr val="tx1"/>
-                </a:solidFill>
-                <a:latin typeface="Arial" panose="020B0604020202020204" pitchFamily="34" charset="0"/>
-                <a:cs typeface="Arial" panose="020B0604020202020204" pitchFamily="34" charset="0"/>
-              </a:rPr>
-              <a:t>ac</a:t>
-            </a:r>
             <a:endParaRPr lang="es-ES" sz="800" i="1" dirty="0">
               <a:solidFill>
                 <a:schemeClr val="tx1"/>
@@ -6605,18 +4568,19 @@
         <p:nvCxnSpPr>
           <p:cNvPr id="408" name="Conector angular 407"/>
           <p:cNvCxnSpPr>
+            <a:stCxn id="244" idx="2"/>
             <a:endCxn id="254" idx="0"/>
           </p:cNvCxnSpPr>
           <p:nvPr/>
         </p:nvCxnSpPr>
         <p:spPr>
-          <a:xfrm rot="5400000">
-            <a:off x="1469936" y="4565771"/>
-            <a:ext cx="726408" cy="26147"/>
+          <a:xfrm rot="16200000" flipH="1">
+            <a:off x="1487103" y="4607328"/>
+            <a:ext cx="658006" cy="28919"/>
           </a:xfrm>
           <a:prstGeom prst="bentConnector3">
             <a:avLst>
-              <a:gd name="adj1" fmla="val 99799"/>
+              <a:gd name="adj1" fmla="val 99955"/>
             </a:avLst>
           </a:prstGeom>
           <a:ln w="12700">
@@ -6644,18 +4608,19 @@
         <p:nvCxnSpPr>
           <p:cNvPr id="409" name="Conector angular 408"/>
           <p:cNvCxnSpPr>
+            <a:stCxn id="533" idx="2"/>
             <a:endCxn id="244" idx="0"/>
           </p:cNvCxnSpPr>
           <p:nvPr/>
         </p:nvCxnSpPr>
         <p:spPr>
-          <a:xfrm rot="16200000" flipH="1">
-            <a:off x="1794034" y="3963262"/>
-            <a:ext cx="113922" cy="42677"/>
+          <a:xfrm rot="5400000">
+            <a:off x="1760351" y="3971034"/>
+            <a:ext cx="147604" cy="65011"/>
           </a:xfrm>
           <a:prstGeom prst="bentConnector3">
             <a:avLst>
-              <a:gd name="adj1" fmla="val 1488"/>
+              <a:gd name="adj1" fmla="val 1413"/>
             </a:avLst>
           </a:prstGeom>
           <a:ln w="12700">
@@ -6753,6 +4718,276 @@
           </a:fontRef>
         </p:style>
       </p:cxnSp>
+      <p:pic>
+        <p:nvPicPr>
+          <p:cNvPr id="8" name="Imagen 7"/>
+          <p:cNvPicPr>
+            <a:picLocks noChangeAspect="1"/>
+          </p:cNvPicPr>
+          <p:nvPr/>
+        </p:nvPicPr>
+        <p:blipFill>
+          <a:blip r:embed="rId2" cstate="print">
+            <a:extLst>
+              <a:ext uri="{28A0092B-C50C-407E-A947-70E740481C1C}">
+                <a14:useLocalDpi xmlns:a14="http://schemas.microsoft.com/office/drawing/2010/main" val="0"/>
+              </a:ext>
+            </a:extLst>
+          </a:blip>
+          <a:stretch>
+            <a:fillRect/>
+          </a:stretch>
+        </p:blipFill>
+        <p:spPr>
+          <a:xfrm>
+            <a:off x="3642146" y="6242162"/>
+            <a:ext cx="2151392" cy="122532"/>
+          </a:xfrm>
+          <a:prstGeom prst="rect">
+            <a:avLst/>
+          </a:prstGeom>
+        </p:spPr>
+      </p:pic>
+      <p:pic>
+        <p:nvPicPr>
+          <p:cNvPr id="11" name="Imagen 10"/>
+          <p:cNvPicPr>
+            <a:picLocks noChangeAspect="1"/>
+          </p:cNvPicPr>
+          <p:nvPr/>
+        </p:nvPicPr>
+        <p:blipFill>
+          <a:blip r:embed="rId3" cstate="print">
+            <a:extLst>
+              <a:ext uri="{28A0092B-C50C-407E-A947-70E740481C1C}">
+                <a14:useLocalDpi xmlns:a14="http://schemas.microsoft.com/office/drawing/2010/main" val="0"/>
+              </a:ext>
+            </a:extLst>
+          </a:blip>
+          <a:stretch>
+            <a:fillRect/>
+          </a:stretch>
+        </p:blipFill>
+        <p:spPr>
+          <a:xfrm>
+            <a:off x="1289398" y="5022330"/>
+            <a:ext cx="1122656" cy="125486"/>
+          </a:xfrm>
+          <a:prstGeom prst="rect">
+            <a:avLst/>
+          </a:prstGeom>
+        </p:spPr>
+      </p:pic>
+      <p:pic>
+        <p:nvPicPr>
+          <p:cNvPr id="20" name="Imagen 19"/>
+          <p:cNvPicPr>
+            <a:picLocks noChangeAspect="1"/>
+          </p:cNvPicPr>
+          <p:nvPr/>
+        </p:nvPicPr>
+        <p:blipFill>
+          <a:blip r:embed="rId4" cstate="print">
+            <a:extLst>
+              <a:ext uri="{28A0092B-C50C-407E-A947-70E740481C1C}">
+                <a14:useLocalDpi xmlns:a14="http://schemas.microsoft.com/office/drawing/2010/main" val="0"/>
+              </a:ext>
+            </a:extLst>
+          </a:blip>
+          <a:stretch>
+            <a:fillRect/>
+          </a:stretch>
+        </p:blipFill>
+        <p:spPr>
+          <a:xfrm>
+            <a:off x="2078006" y="4406708"/>
+            <a:ext cx="1496625" cy="297022"/>
+          </a:xfrm>
+          <a:prstGeom prst="rect">
+            <a:avLst/>
+          </a:prstGeom>
+        </p:spPr>
+      </p:pic>
+      <p:pic>
+        <p:nvPicPr>
+          <p:cNvPr id="21" name="Imagen 20"/>
+          <p:cNvPicPr>
+            <a:picLocks noChangeAspect="1"/>
+          </p:cNvPicPr>
+          <p:nvPr/>
+        </p:nvPicPr>
+        <p:blipFill>
+          <a:blip r:embed="rId5" cstate="print">
+            <a:extLst>
+              <a:ext uri="{28A0092B-C50C-407E-A947-70E740481C1C}">
+                <a14:useLocalDpi xmlns:a14="http://schemas.microsoft.com/office/drawing/2010/main" val="0"/>
+              </a:ext>
+            </a:extLst>
+          </a:blip>
+          <a:stretch>
+            <a:fillRect/>
+          </a:stretch>
+        </p:blipFill>
+        <p:spPr>
+          <a:xfrm>
+            <a:off x="215450" y="4471055"/>
+            <a:ext cx="1112385" cy="301466"/>
+          </a:xfrm>
+          <a:prstGeom prst="rect">
+            <a:avLst/>
+          </a:prstGeom>
+        </p:spPr>
+      </p:pic>
+      <p:pic>
+        <p:nvPicPr>
+          <p:cNvPr id="22" name="Imagen 21"/>
+          <p:cNvPicPr>
+            <a:picLocks noChangeAspect="1"/>
+          </p:cNvPicPr>
+          <p:nvPr/>
+        </p:nvPicPr>
+        <p:blipFill>
+          <a:blip r:embed="rId6" cstate="print">
+            <a:extLst>
+              <a:ext uri="{28A0092B-C50C-407E-A947-70E740481C1C}">
+                <a14:useLocalDpi xmlns:a14="http://schemas.microsoft.com/office/drawing/2010/main" val="0"/>
+              </a:ext>
+            </a:extLst>
+          </a:blip>
+          <a:stretch>
+            <a:fillRect/>
+          </a:stretch>
+        </p:blipFill>
+        <p:spPr>
+          <a:xfrm>
+            <a:off x="3154041" y="5320063"/>
+            <a:ext cx="1171920" cy="112346"/>
+          </a:xfrm>
+          <a:prstGeom prst="rect">
+            <a:avLst/>
+          </a:prstGeom>
+        </p:spPr>
+      </p:pic>
+      <p:pic>
+        <p:nvPicPr>
+          <p:cNvPr id="3" name="Imagen 2"/>
+          <p:cNvPicPr>
+            <a:picLocks noChangeAspect="1"/>
+          </p:cNvPicPr>
+          <p:nvPr/>
+        </p:nvPicPr>
+        <p:blipFill>
+          <a:blip r:embed="rId7" cstate="print">
+            <a:extLst>
+              <a:ext uri="{28A0092B-C50C-407E-A947-70E740481C1C}">
+                <a14:useLocalDpi xmlns:a14="http://schemas.microsoft.com/office/drawing/2010/main" val="0"/>
+              </a:ext>
+            </a:extLst>
+          </a:blip>
+          <a:stretch>
+            <a:fillRect/>
+          </a:stretch>
+        </p:blipFill>
+        <p:spPr>
+          <a:xfrm>
+            <a:off x="6829081" y="3422920"/>
+            <a:ext cx="395444" cy="239663"/>
+          </a:xfrm>
+          <a:prstGeom prst="rect">
+            <a:avLst/>
+          </a:prstGeom>
+        </p:spPr>
+      </p:pic>
+      <p:pic>
+        <p:nvPicPr>
+          <p:cNvPr id="5" name="Imagen 4"/>
+          <p:cNvPicPr>
+            <a:picLocks noChangeAspect="1"/>
+          </p:cNvPicPr>
+          <p:nvPr/>
+        </p:nvPicPr>
+        <p:blipFill>
+          <a:blip r:embed="rId8">
+            <a:extLst>
+              <a:ext uri="{28A0092B-C50C-407E-A947-70E740481C1C}">
+                <a14:useLocalDpi xmlns:a14="http://schemas.microsoft.com/office/drawing/2010/main" val="0"/>
+              </a:ext>
+            </a:extLst>
+          </a:blip>
+          <a:stretch>
+            <a:fillRect/>
+          </a:stretch>
+        </p:blipFill>
+        <p:spPr>
+          <a:xfrm>
+            <a:off x="7637265" y="3431788"/>
+            <a:ext cx="428413" cy="259644"/>
+          </a:xfrm>
+          <a:prstGeom prst="rect">
+            <a:avLst/>
+          </a:prstGeom>
+        </p:spPr>
+      </p:pic>
+      <p:pic>
+        <p:nvPicPr>
+          <p:cNvPr id="6" name="Imagen 5"/>
+          <p:cNvPicPr>
+            <a:picLocks noChangeAspect="1"/>
+          </p:cNvPicPr>
+          <p:nvPr/>
+        </p:nvPicPr>
+        <p:blipFill>
+          <a:blip r:embed="rId9">
+            <a:extLst>
+              <a:ext uri="{28A0092B-C50C-407E-A947-70E740481C1C}">
+                <a14:useLocalDpi xmlns:a14="http://schemas.microsoft.com/office/drawing/2010/main" val="0"/>
+              </a:ext>
+            </a:extLst>
+          </a:blip>
+          <a:stretch>
+            <a:fillRect/>
+          </a:stretch>
+        </p:blipFill>
+        <p:spPr>
+          <a:xfrm>
+            <a:off x="8276184" y="3414750"/>
+            <a:ext cx="413803" cy="272836"/>
+          </a:xfrm>
+          <a:prstGeom prst="rect">
+            <a:avLst/>
+          </a:prstGeom>
+        </p:spPr>
+      </p:pic>
+      <p:pic>
+        <p:nvPicPr>
+          <p:cNvPr id="7" name="Imagen 6"/>
+          <p:cNvPicPr>
+            <a:picLocks noChangeAspect="1"/>
+          </p:cNvPicPr>
+          <p:nvPr/>
+        </p:nvPicPr>
+        <p:blipFill>
+          <a:blip r:embed="rId10" cstate="print">
+            <a:extLst>
+              <a:ext uri="{28A0092B-C50C-407E-A947-70E740481C1C}">
+                <a14:useLocalDpi xmlns:a14="http://schemas.microsoft.com/office/drawing/2010/main" val="0"/>
+              </a:ext>
+            </a:extLst>
+          </a:blip>
+          <a:stretch>
+            <a:fillRect/>
+          </a:stretch>
+        </p:blipFill>
+        <p:spPr>
+          <a:xfrm>
+            <a:off x="5833627" y="2872177"/>
+            <a:ext cx="404896" cy="135890"/>
+          </a:xfrm>
+          <a:prstGeom prst="rect">
+            <a:avLst/>
+          </a:prstGeom>
+        </p:spPr>
+      </p:pic>
     </p:spTree>
     <p:extLst>
       <p:ext uri="{BB962C8B-B14F-4D97-AF65-F5344CB8AC3E}">

</xml_diff>